<commit_message>
added new links for thesis cites, documented OCP attacks, added notes to vector doc
</commit_message>
<xml_diff>
--- a/Screenshots.pptx
+++ b/Screenshots.pptx
@@ -5,15 +5,31 @@
     <p:sldMasterId id="2147483648" r:id="rId1"/>
   </p:sldMasterIdLst>
   <p:notesMasterIdLst>
-    <p:notesMasterId r:id="rId3"/>
+    <p:notesMasterId r:id="rId19"/>
   </p:notesMasterIdLst>
   <p:sldIdLst>
     <p:sldId id="256" r:id="rId2"/>
+    <p:sldId id="260" r:id="rId3"/>
+    <p:sldId id="257" r:id="rId4"/>
+    <p:sldId id="261" r:id="rId5"/>
+    <p:sldId id="262" r:id="rId6"/>
+    <p:sldId id="263" r:id="rId7"/>
+    <p:sldId id="265" r:id="rId8"/>
+    <p:sldId id="264" r:id="rId9"/>
+    <p:sldId id="266" r:id="rId10"/>
+    <p:sldId id="267" r:id="rId11"/>
+    <p:sldId id="258" r:id="rId12"/>
+    <p:sldId id="268" r:id="rId13"/>
+    <p:sldId id="272" r:id="rId14"/>
+    <p:sldId id="269" r:id="rId15"/>
+    <p:sldId id="270" r:id="rId16"/>
+    <p:sldId id="271" r:id="rId17"/>
+    <p:sldId id="273" r:id="rId18"/>
   </p:sldIdLst>
   <p:sldSz cx="12192000" cy="6858000"/>
   <p:notesSz cx="6858000" cy="9144000"/>
   <p:custDataLst>
-    <p:tags r:id="rId4"/>
+    <p:tags r:id="rId20"/>
   </p:custDataLst>
   <p:defaultTextStyle>
     <a:defPPr>
@@ -110,6 +126,11 @@
       </a:defRPr>
     </a:lvl9pPr>
   </p:defaultTextStyle>
+  <p:extLst>
+    <p:ext uri="{EFAFB233-063F-42B5-8137-9DF3F51BA10A}">
+      <p15:sldGuideLst xmlns:p15="http://schemas.microsoft.com/office/powerpoint/2012/main"/>
+    </p:ext>
+  </p:extLst>
 </p:presentation>
 </file>
 
@@ -195,7 +216,7 @@
           <a:p>
             <a:fld id="{4B5D7A1E-C70D-470C-8980-F4393258158A}" type="datetimeFigureOut">
               <a:rPr lang="en-US" smtClean="0"/>
-              <a:t>5/3/2019</a:t>
+              <a:t>6/14/2019</a:t>
             </a:fld>
             <a:endParaRPr lang="en-US"/>
           </a:p>
@@ -912,7 +933,7 @@
           <a:p>
             <a:fld id="{011329FE-3067-425C-BB62-250DE2A431FA}" type="datetimeFigureOut">
               <a:rPr lang="en-US" smtClean="0"/>
-              <a:t>5/3/2019</a:t>
+              <a:t>6/14/2019</a:t>
             </a:fld>
             <a:endParaRPr lang="en-US"/>
           </a:p>
@@ -1082,7 +1103,7 @@
           <a:p>
             <a:fld id="{011329FE-3067-425C-BB62-250DE2A431FA}" type="datetimeFigureOut">
               <a:rPr lang="en-US" smtClean="0"/>
-              <a:t>5/3/2019</a:t>
+              <a:t>6/14/2019</a:t>
             </a:fld>
             <a:endParaRPr lang="en-US"/>
           </a:p>
@@ -1262,7 +1283,7 @@
           <a:p>
             <a:fld id="{011329FE-3067-425C-BB62-250DE2A431FA}" type="datetimeFigureOut">
               <a:rPr lang="en-US" smtClean="0"/>
-              <a:t>5/3/2019</a:t>
+              <a:t>6/14/2019</a:t>
             </a:fld>
             <a:endParaRPr lang="en-US"/>
           </a:p>
@@ -1432,7 +1453,7 @@
           <a:p>
             <a:fld id="{011329FE-3067-425C-BB62-250DE2A431FA}" type="datetimeFigureOut">
               <a:rPr lang="en-US" smtClean="0"/>
-              <a:t>5/3/2019</a:t>
+              <a:t>6/14/2019</a:t>
             </a:fld>
             <a:endParaRPr lang="en-US"/>
           </a:p>
@@ -1678,7 +1699,7 @@
           <a:p>
             <a:fld id="{011329FE-3067-425C-BB62-250DE2A431FA}" type="datetimeFigureOut">
               <a:rPr lang="en-US" smtClean="0"/>
-              <a:t>5/3/2019</a:t>
+              <a:t>6/14/2019</a:t>
             </a:fld>
             <a:endParaRPr lang="en-US"/>
           </a:p>
@@ -1910,7 +1931,7 @@
           <a:p>
             <a:fld id="{011329FE-3067-425C-BB62-250DE2A431FA}" type="datetimeFigureOut">
               <a:rPr lang="en-US" smtClean="0"/>
-              <a:t>5/3/2019</a:t>
+              <a:t>6/14/2019</a:t>
             </a:fld>
             <a:endParaRPr lang="en-US"/>
           </a:p>
@@ -2277,7 +2298,7 @@
           <a:p>
             <a:fld id="{011329FE-3067-425C-BB62-250DE2A431FA}" type="datetimeFigureOut">
               <a:rPr lang="en-US" smtClean="0"/>
-              <a:t>5/3/2019</a:t>
+              <a:t>6/14/2019</a:t>
             </a:fld>
             <a:endParaRPr lang="en-US"/>
           </a:p>
@@ -2395,7 +2416,7 @@
           <a:p>
             <a:fld id="{011329FE-3067-425C-BB62-250DE2A431FA}" type="datetimeFigureOut">
               <a:rPr lang="en-US" smtClean="0"/>
-              <a:t>5/3/2019</a:t>
+              <a:t>6/14/2019</a:t>
             </a:fld>
             <a:endParaRPr lang="en-US"/>
           </a:p>
@@ -2490,7 +2511,7 @@
           <a:p>
             <a:fld id="{011329FE-3067-425C-BB62-250DE2A431FA}" type="datetimeFigureOut">
               <a:rPr lang="en-US" smtClean="0"/>
-              <a:t>5/3/2019</a:t>
+              <a:t>6/14/2019</a:t>
             </a:fld>
             <a:endParaRPr lang="en-US"/>
           </a:p>
@@ -2767,7 +2788,7 @@
           <a:p>
             <a:fld id="{011329FE-3067-425C-BB62-250DE2A431FA}" type="datetimeFigureOut">
               <a:rPr lang="en-US" smtClean="0"/>
-              <a:t>5/3/2019</a:t>
+              <a:t>6/14/2019</a:t>
             </a:fld>
             <a:endParaRPr lang="en-US"/>
           </a:p>
@@ -3020,7 +3041,7 @@
           <a:p>
             <a:fld id="{011329FE-3067-425C-BB62-250DE2A431FA}" type="datetimeFigureOut">
               <a:rPr lang="en-US" smtClean="0"/>
-              <a:t>5/3/2019</a:t>
+              <a:t>6/14/2019</a:t>
             </a:fld>
             <a:endParaRPr lang="en-US"/>
           </a:p>
@@ -3233,7 +3254,7 @@
           <a:p>
             <a:fld id="{011329FE-3067-425C-BB62-250DE2A431FA}" type="datetimeFigureOut">
               <a:rPr lang="en-US" smtClean="0"/>
-              <a:t>5/3/2019</a:t>
+              <a:t>6/14/2019</a:t>
             </a:fld>
             <a:endParaRPr lang="en-US"/>
           </a:p>
@@ -3713,15 +3734,2141 @@
 </p:sld>
 </file>
 
+<file path=ppt/slides/slide10.xml><?xml version="1.0" encoding="utf-8"?>
+<p:sld xmlns:a="http://schemas.openxmlformats.org/drawingml/2006/main" xmlns:r="http://schemas.openxmlformats.org/officeDocument/2006/relationships" xmlns:p="http://schemas.openxmlformats.org/presentationml/2006/main">
+  <p:cSld>
+    <p:spTree>
+      <p:nvGrpSpPr>
+        <p:cNvPr id="1" name=""/>
+        <p:cNvGrpSpPr/>
+        <p:nvPr/>
+      </p:nvGrpSpPr>
+      <p:grpSpPr>
+        <a:xfrm>
+          <a:off x="0" y="0"/>
+          <a:ext cx="0" cy="0"/>
+          <a:chOff x="0" y="0"/>
+          <a:chExt cx="0" cy="0"/>
+        </a:xfrm>
+      </p:grpSpPr>
+      <p:sp>
+        <p:nvSpPr>
+          <p:cNvPr id="2" name="Title 1"/>
+          <p:cNvSpPr>
+            <a:spLocks noGrp="1"/>
+          </p:cNvSpPr>
+          <p:nvPr>
+            <p:ph type="ctrTitle"/>
+          </p:nvPr>
+        </p:nvSpPr>
+        <p:spPr/>
+        <p:txBody>
+          <a:bodyPr/>
+          <a:lstStyle/>
+          <a:p>
+            <a:r>
+              <a:rPr lang="en-US" dirty="0" smtClean="0"/>
+              <a:t>Lateral movement demo</a:t>
+            </a:r>
+            <a:endParaRPr lang="en-US" dirty="0"/>
+          </a:p>
+        </p:txBody>
+      </p:sp>
+      <p:sp>
+        <p:nvSpPr>
+          <p:cNvPr id="3" name="Subtitle 2"/>
+          <p:cNvSpPr>
+            <a:spLocks noGrp="1"/>
+          </p:cNvSpPr>
+          <p:nvPr>
+            <p:ph type="subTitle" idx="1"/>
+          </p:nvPr>
+        </p:nvSpPr>
+        <p:spPr/>
+        <p:txBody>
+          <a:bodyPr/>
+          <a:lstStyle/>
+          <a:p>
+            <a:endParaRPr lang="en-US"/>
+          </a:p>
+        </p:txBody>
+      </p:sp>
+    </p:spTree>
+    <p:extLst>
+      <p:ext uri="{BB962C8B-B14F-4D97-AF65-F5344CB8AC3E}">
+        <p14:creationId xmlns:p14="http://schemas.microsoft.com/office/powerpoint/2010/main" val="4067185416"/>
+      </p:ext>
+    </p:extLst>
+  </p:cSld>
+  <p:clrMapOvr>
+    <a:masterClrMapping/>
+  </p:clrMapOvr>
+</p:sld>
+</file>
+
+<file path=ppt/slides/slide11.xml><?xml version="1.0" encoding="utf-8"?>
+<p:sld xmlns:a="http://schemas.openxmlformats.org/drawingml/2006/main" xmlns:r="http://schemas.openxmlformats.org/officeDocument/2006/relationships" xmlns:p="http://schemas.openxmlformats.org/presentationml/2006/main">
+  <p:cSld>
+    <p:spTree>
+      <p:nvGrpSpPr>
+        <p:cNvPr id="1" name=""/>
+        <p:cNvGrpSpPr/>
+        <p:nvPr/>
+      </p:nvGrpSpPr>
+      <p:grpSpPr>
+        <a:xfrm>
+          <a:off x="0" y="0"/>
+          <a:ext cx="0" cy="0"/>
+          <a:chOff x="0" y="0"/>
+          <a:chExt cx="0" cy="0"/>
+        </a:xfrm>
+      </p:grpSpPr>
+      <p:sp>
+        <p:nvSpPr>
+          <p:cNvPr id="2" name="Title 1"/>
+          <p:cNvSpPr>
+            <a:spLocks noGrp="1"/>
+          </p:cNvSpPr>
+          <p:nvPr>
+            <p:ph type="title"/>
+          </p:nvPr>
+        </p:nvSpPr>
+        <p:spPr/>
+        <p:txBody>
+          <a:bodyPr/>
+          <a:lstStyle/>
+          <a:p>
+            <a:r>
+              <a:rPr lang="en-US" dirty="0" smtClean="0"/>
+              <a:t>Lateral movement commands – set stage</a:t>
+            </a:r>
+            <a:endParaRPr lang="en-US" dirty="0"/>
+          </a:p>
+        </p:txBody>
+      </p:sp>
+      <p:sp>
+        <p:nvSpPr>
+          <p:cNvPr id="3" name="Content Placeholder 2"/>
+          <p:cNvSpPr>
+            <a:spLocks noGrp="1"/>
+          </p:cNvSpPr>
+          <p:nvPr>
+            <p:ph idx="1"/>
+          </p:nvPr>
+        </p:nvSpPr>
+        <p:spPr/>
+        <p:txBody>
+          <a:bodyPr>
+            <a:normAutofit lnSpcReduction="10000"/>
+          </a:bodyPr>
+          <a:lstStyle/>
+          <a:p>
+            <a:r>
+              <a:rPr lang="en-US" dirty="0" smtClean="0"/>
+              <a:t>Display projects:</a:t>
+            </a:r>
+          </a:p>
+          <a:p>
+            <a:pPr lvl="1"/>
+            <a:r>
+              <a:rPr lang="en-US" dirty="0" err="1" smtClean="0"/>
+              <a:t>oc</a:t>
+            </a:r>
+            <a:r>
+              <a:rPr lang="en-US" dirty="0" smtClean="0"/>
+              <a:t> projects</a:t>
+            </a:r>
+            <a:endParaRPr lang="en-US" dirty="0"/>
+          </a:p>
+          <a:p>
+            <a:r>
+              <a:rPr lang="en-US" dirty="0" smtClean="0"/>
+              <a:t>Lookup service </a:t>
+            </a:r>
+            <a:r>
+              <a:rPr lang="en-US" dirty="0" err="1" smtClean="0"/>
+              <a:t>ip</a:t>
+            </a:r>
+            <a:r>
+              <a:rPr lang="en-US" dirty="0" smtClean="0"/>
+              <a:t> from server </a:t>
+            </a:r>
+            <a:r>
+              <a:rPr lang="en-US" dirty="0"/>
+              <a:t>(look for user-</a:t>
+            </a:r>
+            <a:r>
+              <a:rPr lang="en-US" dirty="0" err="1"/>
+              <a:t>db</a:t>
+            </a:r>
+            <a:r>
+              <a:rPr lang="en-US" dirty="0"/>
+              <a:t> </a:t>
+            </a:r>
+            <a:r>
+              <a:rPr lang="en-US" dirty="0" err="1"/>
+              <a:t>ip</a:t>
+            </a:r>
+            <a:r>
+              <a:rPr lang="en-US" dirty="0" smtClean="0"/>
+              <a:t>) :</a:t>
+            </a:r>
+          </a:p>
+          <a:p>
+            <a:pPr lvl="1"/>
+            <a:r>
+              <a:rPr lang="en-US" dirty="0" err="1" smtClean="0"/>
+              <a:t>oc</a:t>
+            </a:r>
+            <a:r>
+              <a:rPr lang="en-US" dirty="0" smtClean="0"/>
+              <a:t> </a:t>
+            </a:r>
+            <a:r>
+              <a:rPr lang="en-US" dirty="0"/>
+              <a:t>get service -n </a:t>
+            </a:r>
+            <a:r>
+              <a:rPr lang="en-US" dirty="0" smtClean="0"/>
+              <a:t>sock-shop</a:t>
+            </a:r>
+          </a:p>
+          <a:p>
+            <a:r>
+              <a:rPr lang="en-US" dirty="0" smtClean="0"/>
+              <a:t>Show container used + </a:t>
+            </a:r>
+            <a:r>
+              <a:rPr lang="en-US" dirty="0" err="1" smtClean="0"/>
+              <a:t>scc’s</a:t>
+            </a:r>
+            <a:r>
+              <a:rPr lang="en-US" dirty="0" smtClean="0"/>
+              <a:t> needed for it:</a:t>
+            </a:r>
+          </a:p>
+          <a:p>
+            <a:pPr lvl="1"/>
+            <a:r>
+              <a:rPr lang="en-US" dirty="0" smtClean="0"/>
+              <a:t>cat network-</a:t>
+            </a:r>
+            <a:r>
+              <a:rPr lang="en-US" dirty="0" err="1" smtClean="0"/>
+              <a:t>utils.yaml</a:t>
+            </a:r>
+            <a:endParaRPr lang="en-US" dirty="0" smtClean="0"/>
+          </a:p>
+          <a:p>
+            <a:pPr lvl="1"/>
+            <a:r>
+              <a:rPr lang="en-US" dirty="0" err="1"/>
+              <a:t>oc</a:t>
+            </a:r>
+            <a:r>
+              <a:rPr lang="en-US" dirty="0"/>
+              <a:t> </a:t>
+            </a:r>
+            <a:r>
+              <a:rPr lang="en-US" dirty="0" err="1"/>
+              <a:t>adm</a:t>
+            </a:r>
+            <a:r>
+              <a:rPr lang="en-US" dirty="0"/>
+              <a:t> policy </a:t>
+            </a:r>
+            <a:r>
+              <a:rPr lang="en-US" dirty="0" err="1"/>
+              <a:t>scc</a:t>
+            </a:r>
+            <a:r>
+              <a:rPr lang="en-US" dirty="0"/>
+              <a:t>-review -z default -f </a:t>
+            </a:r>
+            <a:r>
+              <a:rPr lang="en-US" dirty="0" smtClean="0"/>
+              <a:t>network-</a:t>
+            </a:r>
+            <a:r>
+              <a:rPr lang="en-US" dirty="0" err="1" smtClean="0"/>
+              <a:t>utils.yaml</a:t>
+            </a:r>
+            <a:endParaRPr lang="en-US" dirty="0"/>
+          </a:p>
+          <a:p>
+            <a:r>
+              <a:rPr lang="en-US" dirty="0" smtClean="0"/>
+              <a:t>Start container and enter it:</a:t>
+            </a:r>
+          </a:p>
+          <a:p>
+            <a:pPr lvl="1"/>
+            <a:r>
+              <a:rPr lang="en-US" dirty="0" err="1"/>
+              <a:t>oc</a:t>
+            </a:r>
+            <a:r>
+              <a:rPr lang="en-US" dirty="0"/>
+              <a:t> apply -f </a:t>
+            </a:r>
+            <a:r>
+              <a:rPr lang="en-US" dirty="0" smtClean="0"/>
+              <a:t>network-</a:t>
+            </a:r>
+            <a:r>
+              <a:rPr lang="en-US" dirty="0" err="1" smtClean="0"/>
+              <a:t>utils.yaml</a:t>
+            </a:r>
+            <a:endParaRPr lang="en-US" dirty="0" smtClean="0"/>
+          </a:p>
+          <a:p>
+            <a:pPr lvl="1"/>
+            <a:r>
+              <a:rPr lang="en-US" dirty="0" err="1"/>
+              <a:t>oc</a:t>
+            </a:r>
+            <a:r>
+              <a:rPr lang="en-US" dirty="0"/>
+              <a:t> </a:t>
+            </a:r>
+            <a:r>
+              <a:rPr lang="en-US" dirty="0" err="1"/>
+              <a:t>rsh</a:t>
+            </a:r>
+            <a:r>
+              <a:rPr lang="en-US" dirty="0"/>
+              <a:t> </a:t>
+            </a:r>
+            <a:r>
+              <a:rPr lang="en-US" dirty="0" smtClean="0"/>
+              <a:t>network-</a:t>
+            </a:r>
+            <a:r>
+              <a:rPr lang="en-US" dirty="0" err="1" smtClean="0"/>
+              <a:t>utils</a:t>
+            </a:r>
+            <a:endParaRPr lang="en-US" dirty="0" smtClean="0"/>
+          </a:p>
+          <a:p>
+            <a:endParaRPr lang="en-US" dirty="0"/>
+          </a:p>
+        </p:txBody>
+      </p:sp>
+    </p:spTree>
+    <p:extLst>
+      <p:ext uri="{BB962C8B-B14F-4D97-AF65-F5344CB8AC3E}">
+        <p14:creationId xmlns:p14="http://schemas.microsoft.com/office/powerpoint/2010/main" val="3907535549"/>
+      </p:ext>
+    </p:extLst>
+  </p:cSld>
+  <p:clrMapOvr>
+    <a:masterClrMapping/>
+  </p:clrMapOvr>
+</p:sld>
+</file>
+
+<file path=ppt/slides/slide12.xml><?xml version="1.0" encoding="utf-8"?>
+<p:sld xmlns:a="http://schemas.openxmlformats.org/drawingml/2006/main" xmlns:r="http://schemas.openxmlformats.org/officeDocument/2006/relationships" xmlns:p="http://schemas.openxmlformats.org/presentationml/2006/main">
+  <p:cSld>
+    <p:spTree>
+      <p:nvGrpSpPr>
+        <p:cNvPr id="1" name=""/>
+        <p:cNvGrpSpPr/>
+        <p:nvPr/>
+      </p:nvGrpSpPr>
+      <p:grpSpPr>
+        <a:xfrm>
+          <a:off x="0" y="0"/>
+          <a:ext cx="0" cy="0"/>
+          <a:chOff x="0" y="0"/>
+          <a:chExt cx="0" cy="0"/>
+        </a:xfrm>
+      </p:grpSpPr>
+      <p:sp>
+        <p:nvSpPr>
+          <p:cNvPr id="2" name="Title 1"/>
+          <p:cNvSpPr>
+            <a:spLocks noGrp="1"/>
+          </p:cNvSpPr>
+          <p:nvPr>
+            <p:ph type="title"/>
+          </p:nvPr>
+        </p:nvSpPr>
+        <p:spPr/>
+        <p:txBody>
+          <a:bodyPr/>
+          <a:lstStyle/>
+          <a:p>
+            <a:r>
+              <a:rPr lang="en-US" dirty="0" smtClean="0"/>
+              <a:t>Movement 1 – set stage</a:t>
+            </a:r>
+            <a:endParaRPr lang="en-US" dirty="0"/>
+          </a:p>
+        </p:txBody>
+      </p:sp>
+      <p:pic>
+        <p:nvPicPr>
+          <p:cNvPr id="6" name="Content Placeholder 5"/>
+          <p:cNvPicPr>
+            <a:picLocks noGrp="1" noChangeAspect="1"/>
+          </p:cNvPicPr>
+          <p:nvPr>
+            <p:ph idx="1"/>
+          </p:nvPr>
+        </p:nvPicPr>
+        <p:blipFill>
+          <a:blip r:embed="rId3"/>
+          <a:stretch>
+            <a:fillRect/>
+          </a:stretch>
+        </p:blipFill>
+        <p:spPr>
+          <a:xfrm>
+            <a:off x="2079380" y="1825625"/>
+            <a:ext cx="8033239" cy="4351338"/>
+          </a:xfrm>
+          <a:prstGeom prst="rect">
+            <a:avLst/>
+          </a:prstGeom>
+        </p:spPr>
+      </p:pic>
+      <p:graphicFrame>
+        <p:nvGraphicFramePr>
+          <p:cNvPr id="7" name="Object 6"/>
+          <p:cNvGraphicFramePr>
+            <a:graphicFrameLocks noChangeAspect="1"/>
+          </p:cNvGraphicFramePr>
+          <p:nvPr>
+            <p:extLst>
+              <p:ext uri="{D42A27DB-BD31-4B8C-83A1-F6EECF244321}">
+                <p14:modId xmlns:p14="http://schemas.microsoft.com/office/powerpoint/2010/main" val="535224759"/>
+              </p:ext>
+            </p:extLst>
+          </p:nvPr>
+        </p:nvGraphicFramePr>
+        <p:xfrm>
+          <a:off x="9331325" y="1120775"/>
+          <a:ext cx="1319213" cy="527050"/>
+        </p:xfrm>
+        <a:graphic>
+          <a:graphicData uri="http://schemas.openxmlformats.org/presentationml/2006/ole">
+            <mc:AlternateContent xmlns:mc="http://schemas.openxmlformats.org/markup-compatibility/2006">
+              <mc:Choice xmlns:v="urn:schemas-microsoft-com:vml" Requires="v">
+                <p:oleObj spid="_x0000_s5131" name="Packager Shell Object" showAsIcon="1" r:id="rId4" imgW="1318680" imgH="527400" progId="Package">
+                  <p:embed/>
+                </p:oleObj>
+              </mc:Choice>
+              <mc:Fallback>
+                <p:oleObj name="Packager Shell Object" showAsIcon="1" r:id="rId4" imgW="1318680" imgH="527400" progId="Package">
+                  <p:embed/>
+                  <p:pic>
+                    <p:nvPicPr>
+                      <p:cNvPr id="0" name=""/>
+                      <p:cNvPicPr/>
+                      <p:nvPr/>
+                    </p:nvPicPr>
+                    <p:blipFill>
+                      <a:blip r:embed="rId5"/>
+                      <a:stretch>
+                        <a:fillRect/>
+                      </a:stretch>
+                    </p:blipFill>
+                    <p:spPr>
+                      <a:xfrm>
+                        <a:off x="9331325" y="1120775"/>
+                        <a:ext cx="1319213" cy="527050"/>
+                      </a:xfrm>
+                      <a:prstGeom prst="rect">
+                        <a:avLst/>
+                      </a:prstGeom>
+                    </p:spPr>
+                  </p:pic>
+                </p:oleObj>
+              </mc:Fallback>
+            </mc:AlternateContent>
+          </a:graphicData>
+        </a:graphic>
+      </p:graphicFrame>
+    </p:spTree>
+    <p:extLst>
+      <p:ext uri="{BB962C8B-B14F-4D97-AF65-F5344CB8AC3E}">
+        <p14:creationId xmlns:p14="http://schemas.microsoft.com/office/powerpoint/2010/main" val="911826660"/>
+      </p:ext>
+    </p:extLst>
+  </p:cSld>
+  <p:clrMapOvr>
+    <a:masterClrMapping/>
+  </p:clrMapOvr>
+</p:sld>
+</file>
+
+<file path=ppt/slides/slide13.xml><?xml version="1.0" encoding="utf-8"?>
+<p:sld xmlns:a="http://schemas.openxmlformats.org/drawingml/2006/main" xmlns:r="http://schemas.openxmlformats.org/officeDocument/2006/relationships" xmlns:p="http://schemas.openxmlformats.org/presentationml/2006/main">
+  <p:cSld>
+    <p:spTree>
+      <p:nvGrpSpPr>
+        <p:cNvPr id="1" name=""/>
+        <p:cNvGrpSpPr/>
+        <p:nvPr/>
+      </p:nvGrpSpPr>
+      <p:grpSpPr>
+        <a:xfrm>
+          <a:off x="0" y="0"/>
+          <a:ext cx="0" cy="0"/>
+          <a:chOff x="0" y="0"/>
+          <a:chExt cx="0" cy="0"/>
+        </a:xfrm>
+      </p:grpSpPr>
+      <p:sp>
+        <p:nvSpPr>
+          <p:cNvPr id="2" name="Title 1"/>
+          <p:cNvSpPr>
+            <a:spLocks noGrp="1"/>
+          </p:cNvSpPr>
+          <p:nvPr>
+            <p:ph type="title"/>
+          </p:nvPr>
+        </p:nvSpPr>
+        <p:spPr/>
+        <p:txBody>
+          <a:bodyPr/>
+          <a:lstStyle/>
+          <a:p>
+            <a:r>
+              <a:rPr lang="en-US" dirty="0" smtClean="0"/>
+              <a:t>Lateral movement commands</a:t>
+            </a:r>
+            <a:endParaRPr lang="en-US" dirty="0"/>
+          </a:p>
+        </p:txBody>
+      </p:sp>
+      <p:sp>
+        <p:nvSpPr>
+          <p:cNvPr id="3" name="Content Placeholder 2"/>
+          <p:cNvSpPr>
+            <a:spLocks noGrp="1"/>
+          </p:cNvSpPr>
+          <p:nvPr>
+            <p:ph idx="1"/>
+          </p:nvPr>
+        </p:nvSpPr>
+        <p:spPr/>
+        <p:txBody>
+          <a:bodyPr>
+            <a:normAutofit fontScale="70000" lnSpcReduction="20000"/>
+          </a:bodyPr>
+          <a:lstStyle/>
+          <a:p>
+            <a:r>
+              <a:rPr lang="en-US" dirty="0"/>
+              <a:t>Check availability from within container (in other project</a:t>
+            </a:r>
+            <a:r>
+              <a:rPr lang="en-US" dirty="0" smtClean="0"/>
+              <a:t>) &lt;- TODO: not feasible with -</a:t>
+            </a:r>
+            <a:r>
+              <a:rPr lang="en-US" dirty="0" err="1" smtClean="0"/>
+              <a:t>Pn</a:t>
+            </a:r>
+            <a:r>
+              <a:rPr lang="en-US" dirty="0" smtClean="0"/>
+              <a:t>?!</a:t>
+            </a:r>
+            <a:endParaRPr lang="en-US" dirty="0"/>
+          </a:p>
+          <a:p>
+            <a:pPr lvl="1"/>
+            <a:r>
+              <a:rPr lang="en-US" dirty="0" err="1"/>
+              <a:t>nmap</a:t>
+            </a:r>
+            <a:r>
+              <a:rPr lang="en-US" dirty="0"/>
+              <a:t> -p27017 --script </a:t>
+            </a:r>
+            <a:r>
+              <a:rPr lang="en-US" dirty="0" err="1"/>
+              <a:t>mongodb</a:t>
+            </a:r>
+            <a:r>
+              <a:rPr lang="en-US" dirty="0"/>
+              <a:t>-databases 172.30.2.17 -</a:t>
+            </a:r>
+            <a:r>
+              <a:rPr lang="en-US" dirty="0" err="1"/>
+              <a:t>Pn</a:t>
+            </a:r>
+            <a:endParaRPr lang="en-US" dirty="0"/>
+          </a:p>
+          <a:p>
+            <a:r>
+              <a:rPr lang="en-US" dirty="0"/>
+              <a:t>Download mongo binary, connect to </a:t>
+            </a:r>
+            <a:r>
+              <a:rPr lang="en-US" dirty="0" err="1"/>
+              <a:t>db</a:t>
+            </a:r>
+            <a:r>
+              <a:rPr lang="en-US" dirty="0"/>
+              <a:t> in container:</a:t>
+            </a:r>
+          </a:p>
+          <a:p>
+            <a:pPr lvl="1"/>
+            <a:r>
+              <a:rPr lang="en-US" dirty="0"/>
+              <a:t>curl fastdl.mongodb.org/</a:t>
+            </a:r>
+            <a:r>
+              <a:rPr lang="en-US" dirty="0" err="1"/>
+              <a:t>linux</a:t>
+            </a:r>
+            <a:r>
+              <a:rPr lang="en-US" dirty="0"/>
+              <a:t>/mongodb-linux-x86_64-4.0.10.tgz --resolve fastdl.mongodb.org:80:52.222.167.194 </a:t>
+            </a:r>
+            <a:r>
+              <a:rPr lang="en-US" dirty="0" smtClean="0"/>
+              <a:t>-O</a:t>
+            </a:r>
+            <a:endParaRPr lang="en-US" dirty="0"/>
+          </a:p>
+          <a:p>
+            <a:pPr lvl="1"/>
+            <a:r>
+              <a:rPr lang="en-US" dirty="0"/>
+              <a:t>tar -</a:t>
+            </a:r>
+            <a:r>
+              <a:rPr lang="en-US" dirty="0" err="1"/>
+              <a:t>xvf</a:t>
+            </a:r>
+            <a:r>
+              <a:rPr lang="en-US" dirty="0"/>
+              <a:t> mongodb-linux-x86_64-4.0.10.tgz</a:t>
+            </a:r>
+          </a:p>
+          <a:p>
+            <a:pPr lvl="1"/>
+            <a:r>
+              <a:rPr lang="en-US" dirty="0"/>
+              <a:t>./mongodb-linux-x86_64-4.0.10/bin/mongo 172.30.2.17</a:t>
+            </a:r>
+          </a:p>
+          <a:p>
+            <a:r>
+              <a:rPr lang="en-US" dirty="0"/>
+              <a:t>Search for interesting data:</a:t>
+            </a:r>
+          </a:p>
+          <a:p>
+            <a:pPr lvl="1"/>
+            <a:r>
+              <a:rPr lang="en-US" dirty="0"/>
+              <a:t>show </a:t>
+            </a:r>
+            <a:r>
+              <a:rPr lang="en-US" dirty="0" err="1"/>
+              <a:t>dbs</a:t>
+            </a:r>
+            <a:endParaRPr lang="en-US" dirty="0"/>
+          </a:p>
+          <a:p>
+            <a:pPr lvl="1"/>
+            <a:r>
+              <a:rPr lang="en-US" dirty="0"/>
+              <a:t>use users</a:t>
+            </a:r>
+          </a:p>
+          <a:p>
+            <a:pPr lvl="1"/>
+            <a:r>
+              <a:rPr lang="en-US" dirty="0"/>
+              <a:t>show collections</a:t>
+            </a:r>
+          </a:p>
+          <a:p>
+            <a:pPr lvl="1"/>
+            <a:r>
+              <a:rPr lang="en-US" dirty="0" err="1"/>
+              <a:t>db.customers.find</a:t>
+            </a:r>
+            <a:r>
+              <a:rPr lang="en-US" dirty="0"/>
+              <a:t>()</a:t>
+            </a:r>
+          </a:p>
+          <a:p>
+            <a:pPr lvl="1"/>
+            <a:r>
+              <a:rPr lang="en-US" dirty="0" err="1"/>
+              <a:t>db.addresses.find</a:t>
+            </a:r>
+            <a:r>
+              <a:rPr lang="en-US" dirty="0"/>
+              <a:t>()</a:t>
+            </a:r>
+          </a:p>
+          <a:p>
+            <a:pPr lvl="1"/>
+            <a:r>
+              <a:rPr lang="en-US" dirty="0" err="1"/>
+              <a:t>db.cards.find</a:t>
+            </a:r>
+            <a:r>
+              <a:rPr lang="en-US" dirty="0"/>
+              <a:t>()</a:t>
+            </a:r>
+          </a:p>
+          <a:p>
+            <a:r>
+              <a:rPr lang="en-US" dirty="0"/>
+              <a:t>Mitigate (as </a:t>
+            </a:r>
+            <a:r>
+              <a:rPr lang="en-US" dirty="0" err="1"/>
+              <a:t>ocp</a:t>
+            </a:r>
+            <a:r>
+              <a:rPr lang="en-US" dirty="0"/>
+              <a:t> </a:t>
+            </a:r>
+            <a:r>
+              <a:rPr lang="en-US" dirty="0" err="1"/>
+              <a:t>system:admin</a:t>
+            </a:r>
+            <a:r>
+              <a:rPr lang="en-US" dirty="0"/>
+              <a:t>, needs </a:t>
+            </a:r>
+            <a:r>
+              <a:rPr lang="en-US" dirty="0" err="1"/>
+              <a:t>openshift</a:t>
+            </a:r>
+            <a:r>
+              <a:rPr lang="en-US" dirty="0"/>
+              <a:t>-</a:t>
+            </a:r>
+            <a:r>
+              <a:rPr lang="en-US" dirty="0" err="1"/>
+              <a:t>ovs</a:t>
+            </a:r>
+            <a:r>
+              <a:rPr lang="en-US" dirty="0"/>
+              <a:t>-multitenant SDN plugin!):</a:t>
+            </a:r>
+          </a:p>
+          <a:p>
+            <a:pPr lvl="1"/>
+            <a:r>
+              <a:rPr lang="en-US" dirty="0" err="1"/>
+              <a:t>oc</a:t>
+            </a:r>
+            <a:r>
+              <a:rPr lang="en-US" dirty="0"/>
+              <a:t> </a:t>
+            </a:r>
+            <a:r>
+              <a:rPr lang="en-US" dirty="0" err="1"/>
+              <a:t>adm</a:t>
+            </a:r>
+            <a:r>
+              <a:rPr lang="en-US" dirty="0"/>
+              <a:t> pod-network isolate-projects sock-shop</a:t>
+            </a:r>
+          </a:p>
+        </p:txBody>
+      </p:sp>
+    </p:spTree>
+    <p:extLst>
+      <p:ext uri="{BB962C8B-B14F-4D97-AF65-F5344CB8AC3E}">
+        <p14:creationId xmlns:p14="http://schemas.microsoft.com/office/powerpoint/2010/main" val="2221554115"/>
+      </p:ext>
+    </p:extLst>
+  </p:cSld>
+  <p:clrMapOvr>
+    <a:masterClrMapping/>
+  </p:clrMapOvr>
+</p:sld>
+</file>
+
+<file path=ppt/slides/slide14.xml><?xml version="1.0" encoding="utf-8"?>
+<p:sld xmlns:a="http://schemas.openxmlformats.org/drawingml/2006/main" xmlns:r="http://schemas.openxmlformats.org/officeDocument/2006/relationships" xmlns:p="http://schemas.openxmlformats.org/presentationml/2006/main">
+  <p:cSld>
+    <p:spTree>
+      <p:nvGrpSpPr>
+        <p:cNvPr id="1" name=""/>
+        <p:cNvGrpSpPr/>
+        <p:nvPr/>
+      </p:nvGrpSpPr>
+      <p:grpSpPr>
+        <a:xfrm>
+          <a:off x="0" y="0"/>
+          <a:ext cx="0" cy="0"/>
+          <a:chOff x="0" y="0"/>
+          <a:chExt cx="0" cy="0"/>
+        </a:xfrm>
+      </p:grpSpPr>
+      <p:sp>
+        <p:nvSpPr>
+          <p:cNvPr id="2" name="Title 1"/>
+          <p:cNvSpPr>
+            <a:spLocks noGrp="1"/>
+          </p:cNvSpPr>
+          <p:nvPr>
+            <p:ph type="title"/>
+          </p:nvPr>
+        </p:nvSpPr>
+        <p:spPr/>
+        <p:txBody>
+          <a:bodyPr/>
+          <a:lstStyle/>
+          <a:p>
+            <a:r>
+              <a:rPr lang="en-US" dirty="0" smtClean="0"/>
+              <a:t>Movement 2</a:t>
+            </a:r>
+            <a:endParaRPr lang="en-US" dirty="0"/>
+          </a:p>
+        </p:txBody>
+      </p:sp>
+      <p:pic>
+        <p:nvPicPr>
+          <p:cNvPr id="4" name="Content Placeholder 3"/>
+          <p:cNvPicPr>
+            <a:picLocks noGrp="1" noChangeAspect="1"/>
+          </p:cNvPicPr>
+          <p:nvPr>
+            <p:ph idx="1"/>
+          </p:nvPr>
+        </p:nvPicPr>
+        <p:blipFill>
+          <a:blip r:embed="rId2"/>
+          <a:stretch>
+            <a:fillRect/>
+          </a:stretch>
+        </p:blipFill>
+        <p:spPr>
+          <a:xfrm>
+            <a:off x="2079380" y="1825625"/>
+            <a:ext cx="8033239" cy="4351338"/>
+          </a:xfrm>
+          <a:prstGeom prst="rect">
+            <a:avLst/>
+          </a:prstGeom>
+        </p:spPr>
+      </p:pic>
+    </p:spTree>
+    <p:extLst>
+      <p:ext uri="{BB962C8B-B14F-4D97-AF65-F5344CB8AC3E}">
+        <p14:creationId xmlns:p14="http://schemas.microsoft.com/office/powerpoint/2010/main" val="1929297856"/>
+      </p:ext>
+    </p:extLst>
+  </p:cSld>
+  <p:clrMapOvr>
+    <a:masterClrMapping/>
+  </p:clrMapOvr>
+</p:sld>
+</file>
+
+<file path=ppt/slides/slide15.xml><?xml version="1.0" encoding="utf-8"?>
+<p:sld xmlns:a="http://schemas.openxmlformats.org/drawingml/2006/main" xmlns:r="http://schemas.openxmlformats.org/officeDocument/2006/relationships" xmlns:p="http://schemas.openxmlformats.org/presentationml/2006/main">
+  <p:cSld>
+    <p:spTree>
+      <p:nvGrpSpPr>
+        <p:cNvPr id="1" name=""/>
+        <p:cNvGrpSpPr/>
+        <p:nvPr/>
+      </p:nvGrpSpPr>
+      <p:grpSpPr>
+        <a:xfrm>
+          <a:off x="0" y="0"/>
+          <a:ext cx="0" cy="0"/>
+          <a:chOff x="0" y="0"/>
+          <a:chExt cx="0" cy="0"/>
+        </a:xfrm>
+      </p:grpSpPr>
+      <p:sp>
+        <p:nvSpPr>
+          <p:cNvPr id="2" name="Title 1"/>
+          <p:cNvSpPr>
+            <a:spLocks noGrp="1"/>
+          </p:cNvSpPr>
+          <p:nvPr>
+            <p:ph type="title"/>
+          </p:nvPr>
+        </p:nvSpPr>
+        <p:spPr/>
+        <p:txBody>
+          <a:bodyPr/>
+          <a:lstStyle/>
+          <a:p>
+            <a:r>
+              <a:rPr lang="en-US" dirty="0" smtClean="0"/>
+              <a:t>Movement 3</a:t>
+            </a:r>
+            <a:endParaRPr lang="en-US" dirty="0"/>
+          </a:p>
+        </p:txBody>
+      </p:sp>
+      <p:pic>
+        <p:nvPicPr>
+          <p:cNvPr id="4" name="Content Placeholder 3"/>
+          <p:cNvPicPr>
+            <a:picLocks noGrp="1" noChangeAspect="1"/>
+          </p:cNvPicPr>
+          <p:nvPr>
+            <p:ph idx="1"/>
+          </p:nvPr>
+        </p:nvPicPr>
+        <p:blipFill>
+          <a:blip r:embed="rId2"/>
+          <a:stretch>
+            <a:fillRect/>
+          </a:stretch>
+        </p:blipFill>
+        <p:spPr>
+          <a:xfrm>
+            <a:off x="2079380" y="1825625"/>
+            <a:ext cx="8033239" cy="4351338"/>
+          </a:xfrm>
+          <a:prstGeom prst="rect">
+            <a:avLst/>
+          </a:prstGeom>
+        </p:spPr>
+      </p:pic>
+    </p:spTree>
+    <p:extLst>
+      <p:ext uri="{BB962C8B-B14F-4D97-AF65-F5344CB8AC3E}">
+        <p14:creationId xmlns:p14="http://schemas.microsoft.com/office/powerpoint/2010/main" val="3085755087"/>
+      </p:ext>
+    </p:extLst>
+  </p:cSld>
+  <p:clrMapOvr>
+    <a:masterClrMapping/>
+  </p:clrMapOvr>
+</p:sld>
+</file>
+
+<file path=ppt/slides/slide16.xml><?xml version="1.0" encoding="utf-8"?>
+<p:sld xmlns:a="http://schemas.openxmlformats.org/drawingml/2006/main" xmlns:r="http://schemas.openxmlformats.org/officeDocument/2006/relationships" xmlns:p="http://schemas.openxmlformats.org/presentationml/2006/main">
+  <p:cSld>
+    <p:spTree>
+      <p:nvGrpSpPr>
+        <p:cNvPr id="1" name=""/>
+        <p:cNvGrpSpPr/>
+        <p:nvPr/>
+      </p:nvGrpSpPr>
+      <p:grpSpPr>
+        <a:xfrm>
+          <a:off x="0" y="0"/>
+          <a:ext cx="0" cy="0"/>
+          <a:chOff x="0" y="0"/>
+          <a:chExt cx="0" cy="0"/>
+        </a:xfrm>
+      </p:grpSpPr>
+      <p:sp>
+        <p:nvSpPr>
+          <p:cNvPr id="2" name="Title 1"/>
+          <p:cNvSpPr>
+            <a:spLocks noGrp="1"/>
+          </p:cNvSpPr>
+          <p:nvPr>
+            <p:ph type="title"/>
+          </p:nvPr>
+        </p:nvSpPr>
+        <p:spPr/>
+        <p:txBody>
+          <a:bodyPr/>
+          <a:lstStyle/>
+          <a:p>
+            <a:r>
+              <a:rPr lang="en-US" dirty="0" smtClean="0"/>
+              <a:t>Movement text</a:t>
+            </a:r>
+            <a:endParaRPr lang="en-US" dirty="0"/>
+          </a:p>
+        </p:txBody>
+      </p:sp>
+      <p:graphicFrame>
+        <p:nvGraphicFramePr>
+          <p:cNvPr id="3" name="Object 2"/>
+          <p:cNvGraphicFramePr>
+            <a:graphicFrameLocks noChangeAspect="1"/>
+          </p:cNvGraphicFramePr>
+          <p:nvPr>
+            <p:extLst>
+              <p:ext uri="{D42A27DB-BD31-4B8C-83A1-F6EECF244321}">
+                <p14:modId xmlns:p14="http://schemas.microsoft.com/office/powerpoint/2010/main" val="1514535114"/>
+              </p:ext>
+            </p:extLst>
+          </p:nvPr>
+        </p:nvGraphicFramePr>
+        <p:xfrm>
+          <a:off x="3711575" y="3940175"/>
+          <a:ext cx="1397000" cy="527050"/>
+        </p:xfrm>
+        <a:graphic>
+          <a:graphicData uri="http://schemas.openxmlformats.org/presentationml/2006/ole">
+            <mc:AlternateContent xmlns:mc="http://schemas.openxmlformats.org/markup-compatibility/2006">
+              <mc:Choice xmlns:v="urn:schemas-microsoft-com:vml" Requires="v">
+                <p:oleObj spid="_x0000_s4109" name="Packager Shell Object" showAsIcon="1" r:id="rId3" imgW="1396800" imgH="527400" progId="Package">
+                  <p:embed/>
+                </p:oleObj>
+              </mc:Choice>
+              <mc:Fallback>
+                <p:oleObj name="Packager Shell Object" showAsIcon="1" r:id="rId3" imgW="1396800" imgH="527400" progId="Package">
+                  <p:embed/>
+                  <p:pic>
+                    <p:nvPicPr>
+                      <p:cNvPr id="0" name=""/>
+                      <p:cNvPicPr/>
+                      <p:nvPr/>
+                    </p:nvPicPr>
+                    <p:blipFill>
+                      <a:blip r:embed="rId4"/>
+                      <a:stretch>
+                        <a:fillRect/>
+                      </a:stretch>
+                    </p:blipFill>
+                    <p:spPr>
+                      <a:xfrm>
+                        <a:off x="3711575" y="3940175"/>
+                        <a:ext cx="1397000" cy="527050"/>
+                      </a:xfrm>
+                      <a:prstGeom prst="rect">
+                        <a:avLst/>
+                      </a:prstGeom>
+                    </p:spPr>
+                  </p:pic>
+                </p:oleObj>
+              </mc:Fallback>
+            </mc:AlternateContent>
+          </a:graphicData>
+        </a:graphic>
+      </p:graphicFrame>
+    </p:spTree>
+    <p:extLst>
+      <p:ext uri="{BB962C8B-B14F-4D97-AF65-F5344CB8AC3E}">
+        <p14:creationId xmlns:p14="http://schemas.microsoft.com/office/powerpoint/2010/main" val="2997378531"/>
+      </p:ext>
+    </p:extLst>
+  </p:cSld>
+  <p:clrMapOvr>
+    <a:masterClrMapping/>
+  </p:clrMapOvr>
+</p:sld>
+</file>
+
+<file path=ppt/slides/slide17.xml><?xml version="1.0" encoding="utf-8"?>
+<p:sld xmlns:a="http://schemas.openxmlformats.org/drawingml/2006/main" xmlns:r="http://schemas.openxmlformats.org/officeDocument/2006/relationships" xmlns:p="http://schemas.openxmlformats.org/presentationml/2006/main">
+  <p:cSld>
+    <p:spTree>
+      <p:nvGrpSpPr>
+        <p:cNvPr id="1" name=""/>
+        <p:cNvGrpSpPr/>
+        <p:nvPr/>
+      </p:nvGrpSpPr>
+      <p:grpSpPr>
+        <a:xfrm>
+          <a:off x="0" y="0"/>
+          <a:ext cx="0" cy="0"/>
+          <a:chOff x="0" y="0"/>
+          <a:chExt cx="0" cy="0"/>
+        </a:xfrm>
+      </p:grpSpPr>
+      <p:sp>
+        <p:nvSpPr>
+          <p:cNvPr id="2" name="Title 1"/>
+          <p:cNvSpPr>
+            <a:spLocks noGrp="1"/>
+          </p:cNvSpPr>
+          <p:nvPr>
+            <p:ph type="title"/>
+          </p:nvPr>
+        </p:nvSpPr>
+        <p:spPr/>
+        <p:txBody>
+          <a:bodyPr/>
+          <a:lstStyle/>
+          <a:p>
+            <a:r>
+              <a:rPr lang="en-US" dirty="0" smtClean="0"/>
+              <a:t>Movement remediation</a:t>
+            </a:r>
+            <a:endParaRPr lang="en-US" dirty="0"/>
+          </a:p>
+        </p:txBody>
+      </p:sp>
+      <p:pic>
+        <p:nvPicPr>
+          <p:cNvPr id="6" name="Content Placeholder 5"/>
+          <p:cNvPicPr>
+            <a:picLocks noGrp="1" noChangeAspect="1"/>
+          </p:cNvPicPr>
+          <p:nvPr>
+            <p:ph idx="1"/>
+          </p:nvPr>
+        </p:nvPicPr>
+        <p:blipFill>
+          <a:blip r:embed="rId3"/>
+          <a:stretch>
+            <a:fillRect/>
+          </a:stretch>
+        </p:blipFill>
+        <p:spPr>
+          <a:xfrm>
+            <a:off x="2079380" y="1825625"/>
+            <a:ext cx="8033239" cy="4351338"/>
+          </a:xfrm>
+          <a:prstGeom prst="rect">
+            <a:avLst/>
+          </a:prstGeom>
+        </p:spPr>
+      </p:pic>
+      <p:graphicFrame>
+        <p:nvGraphicFramePr>
+          <p:cNvPr id="7" name="Object 6"/>
+          <p:cNvGraphicFramePr>
+            <a:graphicFrameLocks noChangeAspect="1"/>
+          </p:cNvGraphicFramePr>
+          <p:nvPr>
+            <p:extLst>
+              <p:ext uri="{D42A27DB-BD31-4B8C-83A1-F6EECF244321}">
+                <p14:modId xmlns:p14="http://schemas.microsoft.com/office/powerpoint/2010/main" val="2897556681"/>
+              </p:ext>
+            </p:extLst>
+          </p:nvPr>
+        </p:nvGraphicFramePr>
+        <p:xfrm>
+          <a:off x="8940800" y="1025525"/>
+          <a:ext cx="1758950" cy="527050"/>
+        </p:xfrm>
+        <a:graphic>
+          <a:graphicData uri="http://schemas.openxmlformats.org/presentationml/2006/ole">
+            <mc:AlternateContent xmlns:mc="http://schemas.openxmlformats.org/markup-compatibility/2006">
+              <mc:Choice xmlns:v="urn:schemas-microsoft-com:vml" Requires="v">
+                <p:oleObj spid="_x0000_s6149" name="Packager Shell Object" showAsIcon="1" r:id="rId4" imgW="1758240" imgH="527400" progId="Package">
+                  <p:embed/>
+                </p:oleObj>
+              </mc:Choice>
+              <mc:Fallback>
+                <p:oleObj name="Packager Shell Object" showAsIcon="1" r:id="rId4" imgW="1758240" imgH="527400" progId="Package">
+                  <p:embed/>
+                  <p:pic>
+                    <p:nvPicPr>
+                      <p:cNvPr id="0" name=""/>
+                      <p:cNvPicPr/>
+                      <p:nvPr/>
+                    </p:nvPicPr>
+                    <p:blipFill>
+                      <a:blip r:embed="rId5"/>
+                      <a:stretch>
+                        <a:fillRect/>
+                      </a:stretch>
+                    </p:blipFill>
+                    <p:spPr>
+                      <a:xfrm>
+                        <a:off x="8940800" y="1025525"/>
+                        <a:ext cx="1758950" cy="527050"/>
+                      </a:xfrm>
+                      <a:prstGeom prst="rect">
+                        <a:avLst/>
+                      </a:prstGeom>
+                    </p:spPr>
+                  </p:pic>
+                </p:oleObj>
+              </mc:Fallback>
+            </mc:AlternateContent>
+          </a:graphicData>
+        </a:graphic>
+      </p:graphicFrame>
+    </p:spTree>
+    <p:extLst>
+      <p:ext uri="{BB962C8B-B14F-4D97-AF65-F5344CB8AC3E}">
+        <p14:creationId xmlns:p14="http://schemas.microsoft.com/office/powerpoint/2010/main" val="2154321407"/>
+      </p:ext>
+    </p:extLst>
+  </p:cSld>
+  <p:clrMapOvr>
+    <a:masterClrMapping/>
+  </p:clrMapOvr>
+</p:sld>
+</file>
+
+<file path=ppt/slides/slide2.xml><?xml version="1.0" encoding="utf-8"?>
+<p:sld xmlns:a="http://schemas.openxmlformats.org/drawingml/2006/main" xmlns:r="http://schemas.openxmlformats.org/officeDocument/2006/relationships" xmlns:p="http://schemas.openxmlformats.org/presentationml/2006/main">
+  <p:cSld>
+    <p:spTree>
+      <p:nvGrpSpPr>
+        <p:cNvPr id="1" name=""/>
+        <p:cNvGrpSpPr/>
+        <p:nvPr/>
+      </p:nvGrpSpPr>
+      <p:grpSpPr>
+        <a:xfrm>
+          <a:off x="0" y="0"/>
+          <a:ext cx="0" cy="0"/>
+          <a:chOff x="0" y="0"/>
+          <a:chExt cx="0" cy="0"/>
+        </a:xfrm>
+      </p:grpSpPr>
+      <p:sp>
+        <p:nvSpPr>
+          <p:cNvPr id="2" name="Title 1"/>
+          <p:cNvSpPr>
+            <a:spLocks noGrp="1"/>
+          </p:cNvSpPr>
+          <p:nvPr>
+            <p:ph type="ctrTitle"/>
+          </p:nvPr>
+        </p:nvSpPr>
+        <p:spPr/>
+        <p:txBody>
+          <a:bodyPr/>
+          <a:lstStyle/>
+          <a:p>
+            <a:r>
+              <a:rPr lang="en-US" dirty="0" smtClean="0"/>
+              <a:t>Breakout demo OCP</a:t>
+            </a:r>
+            <a:endParaRPr lang="en-US" dirty="0"/>
+          </a:p>
+        </p:txBody>
+      </p:sp>
+      <p:sp>
+        <p:nvSpPr>
+          <p:cNvPr id="3" name="Subtitle 2"/>
+          <p:cNvSpPr>
+            <a:spLocks noGrp="1"/>
+          </p:cNvSpPr>
+          <p:nvPr>
+            <p:ph type="subTitle" idx="1"/>
+          </p:nvPr>
+        </p:nvSpPr>
+        <p:spPr/>
+        <p:txBody>
+          <a:bodyPr/>
+          <a:lstStyle/>
+          <a:p>
+            <a:endParaRPr lang="en-US"/>
+          </a:p>
+        </p:txBody>
+      </p:sp>
+    </p:spTree>
+    <p:extLst>
+      <p:ext uri="{BB962C8B-B14F-4D97-AF65-F5344CB8AC3E}">
+        <p14:creationId xmlns:p14="http://schemas.microsoft.com/office/powerpoint/2010/main" val="1104697342"/>
+      </p:ext>
+    </p:extLst>
+  </p:cSld>
+  <p:clrMapOvr>
+    <a:masterClrMapping/>
+  </p:clrMapOvr>
+</p:sld>
+</file>
+
+<file path=ppt/slides/slide3.xml><?xml version="1.0" encoding="utf-8"?>
+<p:sld xmlns:a="http://schemas.openxmlformats.org/drawingml/2006/main" xmlns:r="http://schemas.openxmlformats.org/officeDocument/2006/relationships" xmlns:p="http://schemas.openxmlformats.org/presentationml/2006/main">
+  <p:cSld>
+    <p:spTree>
+      <p:nvGrpSpPr>
+        <p:cNvPr id="1" name=""/>
+        <p:cNvGrpSpPr/>
+        <p:nvPr/>
+      </p:nvGrpSpPr>
+      <p:grpSpPr>
+        <a:xfrm>
+          <a:off x="0" y="0"/>
+          <a:ext cx="0" cy="0"/>
+          <a:chOff x="0" y="0"/>
+          <a:chExt cx="0" cy="0"/>
+        </a:xfrm>
+      </p:grpSpPr>
+      <p:sp>
+        <p:nvSpPr>
+          <p:cNvPr id="2" name="Title 1"/>
+          <p:cNvSpPr>
+            <a:spLocks noGrp="1"/>
+          </p:cNvSpPr>
+          <p:nvPr>
+            <p:ph type="title"/>
+          </p:nvPr>
+        </p:nvSpPr>
+        <p:spPr/>
+        <p:txBody>
+          <a:bodyPr/>
+          <a:lstStyle/>
+          <a:p>
+            <a:r>
+              <a:rPr lang="en-US" dirty="0" smtClean="0"/>
+              <a:t>Breakout demo commands</a:t>
+            </a:r>
+            <a:endParaRPr lang="en-US" dirty="0"/>
+          </a:p>
+        </p:txBody>
+      </p:sp>
+      <p:sp>
+        <p:nvSpPr>
+          <p:cNvPr id="3" name="Content Placeholder 2"/>
+          <p:cNvSpPr>
+            <a:spLocks noGrp="1"/>
+          </p:cNvSpPr>
+          <p:nvPr>
+            <p:ph idx="1"/>
+          </p:nvPr>
+        </p:nvSpPr>
+        <p:spPr/>
+        <p:txBody>
+          <a:bodyPr>
+            <a:normAutofit fontScale="47500" lnSpcReduction="20000"/>
+          </a:bodyPr>
+          <a:lstStyle/>
+          <a:p>
+            <a:r>
+              <a:rPr lang="en-US" dirty="0"/>
+              <a:t>cat </a:t>
+            </a:r>
+            <a:r>
+              <a:rPr lang="en-US" dirty="0" err="1" smtClean="0"/>
+              <a:t>container_breakout.yaml</a:t>
+            </a:r>
+            <a:endParaRPr lang="en-US" dirty="0" smtClean="0"/>
+          </a:p>
+          <a:p>
+            <a:endParaRPr lang="en-US" dirty="0"/>
+          </a:p>
+          <a:p>
+            <a:r>
+              <a:rPr lang="en-US" dirty="0" err="1"/>
+              <a:t>oc</a:t>
+            </a:r>
+            <a:r>
+              <a:rPr lang="en-US" dirty="0"/>
+              <a:t> apply -f </a:t>
+            </a:r>
+            <a:r>
+              <a:rPr lang="en-US" dirty="0" err="1" smtClean="0"/>
+              <a:t>container_breakout.yaml</a:t>
+            </a:r>
+            <a:endParaRPr lang="en-US" dirty="0" smtClean="0"/>
+          </a:p>
+          <a:p>
+            <a:endParaRPr lang="en-US" dirty="0" smtClean="0"/>
+          </a:p>
+          <a:p>
+            <a:r>
+              <a:rPr lang="en-US" dirty="0" smtClean="0"/>
+              <a:t>(wait until run through)</a:t>
+            </a:r>
+          </a:p>
+          <a:p>
+            <a:endParaRPr lang="en-US" dirty="0"/>
+          </a:p>
+          <a:p>
+            <a:r>
+              <a:rPr lang="en-US" dirty="0" err="1"/>
+              <a:t>oc</a:t>
+            </a:r>
+            <a:r>
+              <a:rPr lang="en-US" dirty="0"/>
+              <a:t> logs </a:t>
+            </a:r>
+            <a:r>
+              <a:rPr lang="en-US" dirty="0" smtClean="0"/>
+              <a:t>breakout</a:t>
+            </a:r>
+          </a:p>
+          <a:p>
+            <a:endParaRPr lang="en-US" dirty="0"/>
+          </a:p>
+          <a:p>
+            <a:r>
+              <a:rPr lang="en-US" dirty="0" err="1" smtClean="0"/>
+              <a:t>oc</a:t>
+            </a:r>
+            <a:r>
+              <a:rPr lang="en-US" dirty="0" smtClean="0"/>
+              <a:t> </a:t>
+            </a:r>
+            <a:r>
+              <a:rPr lang="en-US" dirty="0" err="1" smtClean="0"/>
+              <a:t>adm</a:t>
+            </a:r>
+            <a:r>
+              <a:rPr lang="en-US" dirty="0" smtClean="0"/>
+              <a:t> policy </a:t>
+            </a:r>
+            <a:r>
+              <a:rPr lang="en-US" dirty="0" err="1" smtClean="0"/>
+              <a:t>scc</a:t>
+            </a:r>
+            <a:r>
+              <a:rPr lang="en-US" dirty="0" smtClean="0"/>
+              <a:t>-review -z default -f </a:t>
+            </a:r>
+            <a:r>
+              <a:rPr lang="en-US" dirty="0" err="1" smtClean="0"/>
+              <a:t>container_breakout.yaml</a:t>
+            </a:r>
+            <a:endParaRPr lang="en-US" dirty="0" smtClean="0"/>
+          </a:p>
+          <a:p>
+            <a:endParaRPr lang="en-US" dirty="0"/>
+          </a:p>
+          <a:p>
+            <a:r>
+              <a:rPr lang="en-US" dirty="0" err="1" smtClean="0"/>
+              <a:t>oc</a:t>
+            </a:r>
+            <a:r>
+              <a:rPr lang="en-US" dirty="0" smtClean="0"/>
+              <a:t> </a:t>
+            </a:r>
+            <a:r>
+              <a:rPr lang="en-US" dirty="0" err="1"/>
+              <a:t>adm</a:t>
+            </a:r>
+            <a:r>
+              <a:rPr lang="en-US" dirty="0"/>
+              <a:t> policy remove-</a:t>
+            </a:r>
+            <a:r>
+              <a:rPr lang="en-US" dirty="0" err="1"/>
+              <a:t>scc</a:t>
+            </a:r>
+            <a:r>
+              <a:rPr lang="en-US" dirty="0"/>
+              <a:t>-from-user privileged -z </a:t>
+            </a:r>
+            <a:r>
+              <a:rPr lang="en-US" dirty="0" smtClean="0"/>
+              <a:t>default</a:t>
+            </a:r>
+          </a:p>
+          <a:p>
+            <a:endParaRPr lang="en-US" dirty="0" smtClean="0"/>
+          </a:p>
+          <a:p>
+            <a:r>
+              <a:rPr lang="en-US" dirty="0" err="1"/>
+              <a:t>oc</a:t>
+            </a:r>
+            <a:r>
+              <a:rPr lang="en-US" dirty="0"/>
+              <a:t> </a:t>
+            </a:r>
+            <a:r>
+              <a:rPr lang="en-US" dirty="0" err="1"/>
+              <a:t>adm</a:t>
+            </a:r>
+            <a:r>
+              <a:rPr lang="en-US" dirty="0"/>
+              <a:t> policy </a:t>
+            </a:r>
+            <a:r>
+              <a:rPr lang="en-US" dirty="0" err="1"/>
+              <a:t>scc</a:t>
+            </a:r>
+            <a:r>
+              <a:rPr lang="en-US" dirty="0"/>
+              <a:t>-review -z default -f </a:t>
+            </a:r>
+            <a:r>
+              <a:rPr lang="en-US" dirty="0" err="1"/>
+              <a:t>container_breakout.yaml</a:t>
+            </a:r>
+            <a:endParaRPr lang="en-US" dirty="0"/>
+          </a:p>
+          <a:p>
+            <a:pPr marL="0" indent="0">
+              <a:buNone/>
+            </a:pPr>
+            <a:endParaRPr lang="en-US" dirty="0" smtClean="0"/>
+          </a:p>
+          <a:p>
+            <a:pPr marL="0" indent="0">
+              <a:buNone/>
+            </a:pPr>
+            <a:r>
+              <a:rPr lang="en-US" dirty="0" smtClean="0"/>
+              <a:t>(to add again: )</a:t>
+            </a:r>
+          </a:p>
+          <a:p>
+            <a:r>
+              <a:rPr lang="en-US" dirty="0" err="1" smtClean="0"/>
+              <a:t>oc</a:t>
+            </a:r>
+            <a:r>
+              <a:rPr lang="en-US" dirty="0" smtClean="0"/>
+              <a:t> </a:t>
+            </a:r>
+            <a:r>
+              <a:rPr lang="en-US" dirty="0" err="1"/>
+              <a:t>adm</a:t>
+            </a:r>
+            <a:r>
+              <a:rPr lang="en-US" dirty="0"/>
+              <a:t> policy add-</a:t>
+            </a:r>
+            <a:r>
+              <a:rPr lang="en-US" dirty="0" err="1"/>
+              <a:t>scc</a:t>
+            </a:r>
+            <a:r>
+              <a:rPr lang="en-US" dirty="0"/>
+              <a:t>-to-user privileged -z default</a:t>
+            </a:r>
+          </a:p>
+        </p:txBody>
+      </p:sp>
+    </p:spTree>
+    <p:extLst>
+      <p:ext uri="{BB962C8B-B14F-4D97-AF65-F5344CB8AC3E}">
+        <p14:creationId xmlns:p14="http://schemas.microsoft.com/office/powerpoint/2010/main" val="3767538806"/>
+      </p:ext>
+    </p:extLst>
+  </p:cSld>
+  <p:clrMapOvr>
+    <a:masterClrMapping/>
+  </p:clrMapOvr>
+</p:sld>
+</file>
+
+<file path=ppt/slides/slide4.xml><?xml version="1.0" encoding="utf-8"?>
+<p:sld xmlns:a="http://schemas.openxmlformats.org/drawingml/2006/main" xmlns:r="http://schemas.openxmlformats.org/officeDocument/2006/relationships" xmlns:p="http://schemas.openxmlformats.org/presentationml/2006/main">
+  <p:cSld>
+    <p:spTree>
+      <p:nvGrpSpPr>
+        <p:cNvPr id="1" name=""/>
+        <p:cNvGrpSpPr/>
+        <p:nvPr/>
+      </p:nvGrpSpPr>
+      <p:grpSpPr>
+        <a:xfrm>
+          <a:off x="0" y="0"/>
+          <a:ext cx="0" cy="0"/>
+          <a:chOff x="0" y="0"/>
+          <a:chExt cx="0" cy="0"/>
+        </a:xfrm>
+      </p:grpSpPr>
+      <p:sp>
+        <p:nvSpPr>
+          <p:cNvPr id="2" name="Title 1"/>
+          <p:cNvSpPr>
+            <a:spLocks noGrp="1"/>
+          </p:cNvSpPr>
+          <p:nvPr>
+            <p:ph type="title"/>
+          </p:nvPr>
+        </p:nvSpPr>
+        <p:spPr/>
+        <p:txBody>
+          <a:bodyPr/>
+          <a:lstStyle/>
+          <a:p>
+            <a:r>
+              <a:rPr lang="en-US" dirty="0" smtClean="0"/>
+              <a:t>Container breakout 1</a:t>
+            </a:r>
+            <a:endParaRPr lang="en-US" dirty="0"/>
+          </a:p>
+        </p:txBody>
+      </p:sp>
+      <p:pic>
+        <p:nvPicPr>
+          <p:cNvPr id="5" name="Content Placeholder 4"/>
+          <p:cNvPicPr>
+            <a:picLocks noGrp="1" noChangeAspect="1"/>
+          </p:cNvPicPr>
+          <p:nvPr>
+            <p:ph idx="1"/>
+          </p:nvPr>
+        </p:nvPicPr>
+        <p:blipFill>
+          <a:blip r:embed="rId2"/>
+          <a:stretch>
+            <a:fillRect/>
+          </a:stretch>
+        </p:blipFill>
+        <p:spPr>
+          <a:xfrm>
+            <a:off x="2079380" y="1825625"/>
+            <a:ext cx="8033239" cy="4351338"/>
+          </a:xfrm>
+          <a:prstGeom prst="rect">
+            <a:avLst/>
+          </a:prstGeom>
+        </p:spPr>
+      </p:pic>
+    </p:spTree>
+    <p:extLst>
+      <p:ext uri="{BB962C8B-B14F-4D97-AF65-F5344CB8AC3E}">
+        <p14:creationId xmlns:p14="http://schemas.microsoft.com/office/powerpoint/2010/main" val="1860803444"/>
+      </p:ext>
+    </p:extLst>
+  </p:cSld>
+  <p:clrMapOvr>
+    <a:masterClrMapping/>
+  </p:clrMapOvr>
+</p:sld>
+</file>
+
+<file path=ppt/slides/slide5.xml><?xml version="1.0" encoding="utf-8"?>
+<p:sld xmlns:a="http://schemas.openxmlformats.org/drawingml/2006/main" xmlns:r="http://schemas.openxmlformats.org/officeDocument/2006/relationships" xmlns:p="http://schemas.openxmlformats.org/presentationml/2006/main">
+  <p:cSld>
+    <p:spTree>
+      <p:nvGrpSpPr>
+        <p:cNvPr id="1" name=""/>
+        <p:cNvGrpSpPr/>
+        <p:nvPr/>
+      </p:nvGrpSpPr>
+      <p:grpSpPr>
+        <a:xfrm>
+          <a:off x="0" y="0"/>
+          <a:ext cx="0" cy="0"/>
+          <a:chOff x="0" y="0"/>
+          <a:chExt cx="0" cy="0"/>
+        </a:xfrm>
+      </p:grpSpPr>
+      <p:sp>
+        <p:nvSpPr>
+          <p:cNvPr id="2" name="Title 1"/>
+          <p:cNvSpPr>
+            <a:spLocks noGrp="1"/>
+          </p:cNvSpPr>
+          <p:nvPr>
+            <p:ph type="title"/>
+          </p:nvPr>
+        </p:nvSpPr>
+        <p:spPr/>
+        <p:txBody>
+          <a:bodyPr/>
+          <a:lstStyle/>
+          <a:p>
+            <a:r>
+              <a:rPr lang="en-US" dirty="0" smtClean="0"/>
+              <a:t>Container breakout 2</a:t>
+            </a:r>
+            <a:endParaRPr lang="en-US" dirty="0"/>
+          </a:p>
+        </p:txBody>
+      </p:sp>
+      <p:pic>
+        <p:nvPicPr>
+          <p:cNvPr id="6" name="Content Placeholder 5"/>
+          <p:cNvPicPr>
+            <a:picLocks noGrp="1" noChangeAspect="1"/>
+          </p:cNvPicPr>
+          <p:nvPr>
+            <p:ph idx="1"/>
+          </p:nvPr>
+        </p:nvPicPr>
+        <p:blipFill>
+          <a:blip r:embed="rId2"/>
+          <a:stretch>
+            <a:fillRect/>
+          </a:stretch>
+        </p:blipFill>
+        <p:spPr>
+          <a:xfrm>
+            <a:off x="2079380" y="1825625"/>
+            <a:ext cx="8033239" cy="4351338"/>
+          </a:xfrm>
+          <a:prstGeom prst="rect">
+            <a:avLst/>
+          </a:prstGeom>
+        </p:spPr>
+      </p:pic>
+    </p:spTree>
+    <p:extLst>
+      <p:ext uri="{BB962C8B-B14F-4D97-AF65-F5344CB8AC3E}">
+        <p14:creationId xmlns:p14="http://schemas.microsoft.com/office/powerpoint/2010/main" val="3049121098"/>
+      </p:ext>
+    </p:extLst>
+  </p:cSld>
+  <p:clrMapOvr>
+    <a:masterClrMapping/>
+  </p:clrMapOvr>
+</p:sld>
+</file>
+
+<file path=ppt/slides/slide6.xml><?xml version="1.0" encoding="utf-8"?>
+<p:sld xmlns:a="http://schemas.openxmlformats.org/drawingml/2006/main" xmlns:r="http://schemas.openxmlformats.org/officeDocument/2006/relationships" xmlns:p="http://schemas.openxmlformats.org/presentationml/2006/main">
+  <p:cSld>
+    <p:spTree>
+      <p:nvGrpSpPr>
+        <p:cNvPr id="1" name=""/>
+        <p:cNvGrpSpPr/>
+        <p:nvPr/>
+      </p:nvGrpSpPr>
+      <p:grpSpPr>
+        <a:xfrm>
+          <a:off x="0" y="0"/>
+          <a:ext cx="0" cy="0"/>
+          <a:chOff x="0" y="0"/>
+          <a:chExt cx="0" cy="0"/>
+        </a:xfrm>
+      </p:grpSpPr>
+      <p:sp>
+        <p:nvSpPr>
+          <p:cNvPr id="2" name="Title 1"/>
+          <p:cNvSpPr>
+            <a:spLocks noGrp="1"/>
+          </p:cNvSpPr>
+          <p:nvPr>
+            <p:ph type="title"/>
+          </p:nvPr>
+        </p:nvSpPr>
+        <p:spPr/>
+        <p:txBody>
+          <a:bodyPr/>
+          <a:lstStyle/>
+          <a:p>
+            <a:r>
+              <a:rPr lang="en-US" dirty="0" smtClean="0"/>
+              <a:t>Container breakout 3</a:t>
+            </a:r>
+            <a:endParaRPr lang="en-US" dirty="0"/>
+          </a:p>
+        </p:txBody>
+      </p:sp>
+      <p:pic>
+        <p:nvPicPr>
+          <p:cNvPr id="4" name="Content Placeholder 3"/>
+          <p:cNvPicPr>
+            <a:picLocks noGrp="1" noChangeAspect="1"/>
+          </p:cNvPicPr>
+          <p:nvPr>
+            <p:ph idx="1"/>
+          </p:nvPr>
+        </p:nvPicPr>
+        <p:blipFill>
+          <a:blip r:embed="rId2"/>
+          <a:stretch>
+            <a:fillRect/>
+          </a:stretch>
+        </p:blipFill>
+        <p:spPr>
+          <a:xfrm>
+            <a:off x="2079380" y="1825625"/>
+            <a:ext cx="8033239" cy="4351338"/>
+          </a:xfrm>
+          <a:prstGeom prst="rect">
+            <a:avLst/>
+          </a:prstGeom>
+        </p:spPr>
+      </p:pic>
+    </p:spTree>
+    <p:extLst>
+      <p:ext uri="{BB962C8B-B14F-4D97-AF65-F5344CB8AC3E}">
+        <p14:creationId xmlns:p14="http://schemas.microsoft.com/office/powerpoint/2010/main" val="2624209875"/>
+      </p:ext>
+    </p:extLst>
+  </p:cSld>
+  <p:clrMapOvr>
+    <a:masterClrMapping/>
+  </p:clrMapOvr>
+</p:sld>
+</file>
+
+<file path=ppt/slides/slide7.xml><?xml version="1.0" encoding="utf-8"?>
+<p:sld xmlns:a="http://schemas.openxmlformats.org/drawingml/2006/main" xmlns:r="http://schemas.openxmlformats.org/officeDocument/2006/relationships" xmlns:p="http://schemas.openxmlformats.org/presentationml/2006/main">
+  <p:cSld>
+    <p:spTree>
+      <p:nvGrpSpPr>
+        <p:cNvPr id="1" name=""/>
+        <p:cNvGrpSpPr/>
+        <p:nvPr/>
+      </p:nvGrpSpPr>
+      <p:grpSpPr>
+        <a:xfrm>
+          <a:off x="0" y="0"/>
+          <a:ext cx="0" cy="0"/>
+          <a:chOff x="0" y="0"/>
+          <a:chExt cx="0" cy="0"/>
+        </a:xfrm>
+      </p:grpSpPr>
+      <p:sp>
+        <p:nvSpPr>
+          <p:cNvPr id="2" name="Title 1"/>
+          <p:cNvSpPr>
+            <a:spLocks noGrp="1"/>
+          </p:cNvSpPr>
+          <p:nvPr>
+            <p:ph type="title"/>
+          </p:nvPr>
+        </p:nvSpPr>
+        <p:spPr/>
+        <p:txBody>
+          <a:bodyPr/>
+          <a:lstStyle/>
+          <a:p>
+            <a:r>
+              <a:rPr lang="en-US" dirty="0" smtClean="0"/>
+              <a:t>Container breakout result</a:t>
+            </a:r>
+            <a:endParaRPr lang="en-US" dirty="0"/>
+          </a:p>
+        </p:txBody>
+      </p:sp>
+      <p:pic>
+        <p:nvPicPr>
+          <p:cNvPr id="5" name="Content Placeholder 4"/>
+          <p:cNvPicPr>
+            <a:picLocks noGrp="1" noChangeAspect="1"/>
+          </p:cNvPicPr>
+          <p:nvPr>
+            <p:ph idx="1"/>
+          </p:nvPr>
+        </p:nvPicPr>
+        <p:blipFill>
+          <a:blip r:embed="rId2"/>
+          <a:stretch>
+            <a:fillRect/>
+          </a:stretch>
+        </p:blipFill>
+        <p:spPr>
+          <a:xfrm>
+            <a:off x="2079380" y="1825625"/>
+            <a:ext cx="8033239" cy="4351338"/>
+          </a:xfrm>
+          <a:prstGeom prst="rect">
+            <a:avLst/>
+          </a:prstGeom>
+        </p:spPr>
+      </p:pic>
+    </p:spTree>
+    <p:extLst>
+      <p:ext uri="{BB962C8B-B14F-4D97-AF65-F5344CB8AC3E}">
+        <p14:creationId xmlns:p14="http://schemas.microsoft.com/office/powerpoint/2010/main" val="2024461899"/>
+      </p:ext>
+    </p:extLst>
+  </p:cSld>
+  <p:clrMapOvr>
+    <a:masterClrMapping/>
+  </p:clrMapOvr>
+</p:sld>
+</file>
+
+<file path=ppt/slides/slide8.xml><?xml version="1.0" encoding="utf-8"?>
+<p:sld xmlns:a="http://schemas.openxmlformats.org/drawingml/2006/main" xmlns:r="http://schemas.openxmlformats.org/officeDocument/2006/relationships" xmlns:p="http://schemas.openxmlformats.org/presentationml/2006/main">
+  <p:cSld>
+    <p:spTree>
+      <p:nvGrpSpPr>
+        <p:cNvPr id="1" name=""/>
+        <p:cNvGrpSpPr/>
+        <p:nvPr/>
+      </p:nvGrpSpPr>
+      <p:grpSpPr>
+        <a:xfrm>
+          <a:off x="0" y="0"/>
+          <a:ext cx="0" cy="0"/>
+          <a:chOff x="0" y="0"/>
+          <a:chExt cx="0" cy="0"/>
+        </a:xfrm>
+      </p:grpSpPr>
+      <p:sp>
+        <p:nvSpPr>
+          <p:cNvPr id="2" name="Title 1"/>
+          <p:cNvSpPr>
+            <a:spLocks noGrp="1"/>
+          </p:cNvSpPr>
+          <p:nvPr>
+            <p:ph type="title"/>
+          </p:nvPr>
+        </p:nvSpPr>
+        <p:spPr/>
+        <p:txBody>
+          <a:bodyPr/>
+          <a:lstStyle/>
+          <a:p>
+            <a:r>
+              <a:rPr lang="en-US" dirty="0" smtClean="0"/>
+              <a:t>Container breakout text</a:t>
+            </a:r>
+            <a:endParaRPr lang="en-US" dirty="0"/>
+          </a:p>
+        </p:txBody>
+      </p:sp>
+      <p:graphicFrame>
+        <p:nvGraphicFramePr>
+          <p:cNvPr id="5" name="Object 4"/>
+          <p:cNvGraphicFramePr>
+            <a:graphicFrameLocks noChangeAspect="1"/>
+          </p:cNvGraphicFramePr>
+          <p:nvPr>
+            <p:extLst>
+              <p:ext uri="{D42A27DB-BD31-4B8C-83A1-F6EECF244321}">
+                <p14:modId xmlns:p14="http://schemas.microsoft.com/office/powerpoint/2010/main" val="995914169"/>
+              </p:ext>
+            </p:extLst>
+          </p:nvPr>
+        </p:nvGraphicFramePr>
+        <p:xfrm>
+          <a:off x="5131550" y="3155933"/>
+          <a:ext cx="1524000" cy="527050"/>
+        </p:xfrm>
+        <a:graphic>
+          <a:graphicData uri="http://schemas.openxmlformats.org/presentationml/2006/ole">
+            <mc:AlternateContent xmlns:mc="http://schemas.openxmlformats.org/markup-compatibility/2006">
+              <mc:Choice xmlns:v="urn:schemas-microsoft-com:vml" Requires="v">
+                <p:oleObj spid="_x0000_s2098" name="Packager Shell Object" showAsIcon="1" r:id="rId3" imgW="1523880" imgH="527400" progId="Package">
+                  <p:embed/>
+                </p:oleObj>
+              </mc:Choice>
+              <mc:Fallback>
+                <p:oleObj name="Packager Shell Object" showAsIcon="1" r:id="rId3" imgW="1523880" imgH="527400" progId="Package">
+                  <p:embed/>
+                  <p:pic>
+                    <p:nvPicPr>
+                      <p:cNvPr id="0" name=""/>
+                      <p:cNvPicPr/>
+                      <p:nvPr/>
+                    </p:nvPicPr>
+                    <p:blipFill>
+                      <a:blip r:embed="rId4"/>
+                      <a:stretch>
+                        <a:fillRect/>
+                      </a:stretch>
+                    </p:blipFill>
+                    <p:spPr>
+                      <a:xfrm>
+                        <a:off x="5131550" y="3155933"/>
+                        <a:ext cx="1524000" cy="527050"/>
+                      </a:xfrm>
+                      <a:prstGeom prst="rect">
+                        <a:avLst/>
+                      </a:prstGeom>
+                    </p:spPr>
+                  </p:pic>
+                </p:oleObj>
+              </mc:Fallback>
+            </mc:AlternateContent>
+          </a:graphicData>
+        </a:graphic>
+      </p:graphicFrame>
+      <p:graphicFrame>
+        <p:nvGraphicFramePr>
+          <p:cNvPr id="6" name="Object 5"/>
+          <p:cNvGraphicFramePr>
+            <a:graphicFrameLocks noChangeAspect="1"/>
+          </p:cNvGraphicFramePr>
+          <p:nvPr>
+            <p:extLst>
+              <p:ext uri="{D42A27DB-BD31-4B8C-83A1-F6EECF244321}">
+                <p14:modId xmlns:p14="http://schemas.microsoft.com/office/powerpoint/2010/main" val="4271857220"/>
+              </p:ext>
+            </p:extLst>
+          </p:nvPr>
+        </p:nvGraphicFramePr>
+        <p:xfrm>
+          <a:off x="7697300" y="3155933"/>
+          <a:ext cx="1933575" cy="527050"/>
+        </p:xfrm>
+        <a:graphic>
+          <a:graphicData uri="http://schemas.openxmlformats.org/presentationml/2006/ole">
+            <mc:AlternateContent xmlns:mc="http://schemas.openxmlformats.org/markup-compatibility/2006">
+              <mc:Choice xmlns:v="urn:schemas-microsoft-com:vml" Requires="v">
+                <p:oleObj spid="_x0000_s2099" name="Packager Shell Object" showAsIcon="1" r:id="rId5" imgW="1934280" imgH="527400" progId="Package">
+                  <p:embed/>
+                </p:oleObj>
+              </mc:Choice>
+              <mc:Fallback>
+                <p:oleObj name="Packager Shell Object" showAsIcon="1" r:id="rId5" imgW="1934280" imgH="527400" progId="Package">
+                  <p:embed/>
+                  <p:pic>
+                    <p:nvPicPr>
+                      <p:cNvPr id="0" name=""/>
+                      <p:cNvPicPr/>
+                      <p:nvPr/>
+                    </p:nvPicPr>
+                    <p:blipFill>
+                      <a:blip r:embed="rId6"/>
+                      <a:stretch>
+                        <a:fillRect/>
+                      </a:stretch>
+                    </p:blipFill>
+                    <p:spPr>
+                      <a:xfrm>
+                        <a:off x="7697300" y="3155933"/>
+                        <a:ext cx="1933575" cy="527050"/>
+                      </a:xfrm>
+                      <a:prstGeom prst="rect">
+                        <a:avLst/>
+                      </a:prstGeom>
+                    </p:spPr>
+                  </p:pic>
+                </p:oleObj>
+              </mc:Fallback>
+            </mc:AlternateContent>
+          </a:graphicData>
+        </a:graphic>
+      </p:graphicFrame>
+    </p:spTree>
+    <p:extLst>
+      <p:ext uri="{BB962C8B-B14F-4D97-AF65-F5344CB8AC3E}">
+        <p14:creationId xmlns:p14="http://schemas.microsoft.com/office/powerpoint/2010/main" val="3633912724"/>
+      </p:ext>
+    </p:extLst>
+  </p:cSld>
+  <p:clrMapOvr>
+    <a:masterClrMapping/>
+  </p:clrMapOvr>
+</p:sld>
+</file>
+
+<file path=ppt/slides/slide9.xml><?xml version="1.0" encoding="utf-8"?>
+<p:sld xmlns:a="http://schemas.openxmlformats.org/drawingml/2006/main" xmlns:r="http://schemas.openxmlformats.org/officeDocument/2006/relationships" xmlns:p="http://schemas.openxmlformats.org/presentationml/2006/main">
+  <p:cSld>
+    <p:spTree>
+      <p:nvGrpSpPr>
+        <p:cNvPr id="1" name=""/>
+        <p:cNvGrpSpPr/>
+        <p:nvPr/>
+      </p:nvGrpSpPr>
+      <p:grpSpPr>
+        <a:xfrm>
+          <a:off x="0" y="0"/>
+          <a:ext cx="0" cy="0"/>
+          <a:chOff x="0" y="0"/>
+          <a:chExt cx="0" cy="0"/>
+        </a:xfrm>
+      </p:grpSpPr>
+      <p:sp>
+        <p:nvSpPr>
+          <p:cNvPr id="2" name="Title 1"/>
+          <p:cNvSpPr>
+            <a:spLocks noGrp="1"/>
+          </p:cNvSpPr>
+          <p:nvPr>
+            <p:ph type="title"/>
+          </p:nvPr>
+        </p:nvSpPr>
+        <p:spPr/>
+        <p:txBody>
+          <a:bodyPr/>
+          <a:lstStyle/>
+          <a:p>
+            <a:r>
+              <a:rPr lang="en-US" dirty="0" smtClean="0"/>
+              <a:t>Container breakout remediation</a:t>
+            </a:r>
+            <a:endParaRPr lang="en-US" dirty="0"/>
+          </a:p>
+        </p:txBody>
+      </p:sp>
+      <p:pic>
+        <p:nvPicPr>
+          <p:cNvPr id="4" name="Content Placeholder 3"/>
+          <p:cNvPicPr>
+            <a:picLocks noGrp="1" noChangeAspect="1"/>
+          </p:cNvPicPr>
+          <p:nvPr>
+            <p:ph idx="1"/>
+          </p:nvPr>
+        </p:nvPicPr>
+        <p:blipFill>
+          <a:blip r:embed="rId3"/>
+          <a:stretch>
+            <a:fillRect/>
+          </a:stretch>
+        </p:blipFill>
+        <p:spPr>
+          <a:xfrm>
+            <a:off x="2079380" y="1825625"/>
+            <a:ext cx="8033239" cy="4351338"/>
+          </a:xfrm>
+          <a:prstGeom prst="rect">
+            <a:avLst/>
+          </a:prstGeom>
+        </p:spPr>
+      </p:pic>
+      <p:graphicFrame>
+        <p:nvGraphicFramePr>
+          <p:cNvPr id="5" name="Object 4"/>
+          <p:cNvGraphicFramePr>
+            <a:graphicFrameLocks noChangeAspect="1"/>
+          </p:cNvGraphicFramePr>
+          <p:nvPr>
+            <p:extLst>
+              <p:ext uri="{D42A27DB-BD31-4B8C-83A1-F6EECF244321}">
+                <p14:modId xmlns:p14="http://schemas.microsoft.com/office/powerpoint/2010/main" val="1385945623"/>
+              </p:ext>
+            </p:extLst>
+          </p:nvPr>
+        </p:nvGraphicFramePr>
+        <p:xfrm>
+          <a:off x="9155356" y="764381"/>
+          <a:ext cx="1914525" cy="527050"/>
+        </p:xfrm>
+        <a:graphic>
+          <a:graphicData uri="http://schemas.openxmlformats.org/presentationml/2006/ole">
+            <mc:AlternateContent xmlns:mc="http://schemas.openxmlformats.org/markup-compatibility/2006">
+              <mc:Choice xmlns:v="urn:schemas-microsoft-com:vml" Requires="v">
+                <p:oleObj spid="_x0000_s3096" name="Packager Shell Object" showAsIcon="1" r:id="rId4" imgW="1914840" imgH="527400" progId="Package">
+                  <p:embed/>
+                </p:oleObj>
+              </mc:Choice>
+              <mc:Fallback>
+                <p:oleObj name="Packager Shell Object" showAsIcon="1" r:id="rId4" imgW="1914840" imgH="527400" progId="Package">
+                  <p:embed/>
+                  <p:pic>
+                    <p:nvPicPr>
+                      <p:cNvPr id="0" name=""/>
+                      <p:cNvPicPr/>
+                      <p:nvPr/>
+                    </p:nvPicPr>
+                    <p:blipFill>
+                      <a:blip r:embed="rId5"/>
+                      <a:stretch>
+                        <a:fillRect/>
+                      </a:stretch>
+                    </p:blipFill>
+                    <p:spPr>
+                      <a:xfrm>
+                        <a:off x="9155356" y="764381"/>
+                        <a:ext cx="1914525" cy="527050"/>
+                      </a:xfrm>
+                      <a:prstGeom prst="rect">
+                        <a:avLst/>
+                      </a:prstGeom>
+                    </p:spPr>
+                  </p:pic>
+                </p:oleObj>
+              </mc:Fallback>
+            </mc:AlternateContent>
+          </a:graphicData>
+        </a:graphic>
+      </p:graphicFrame>
+    </p:spTree>
+    <p:extLst>
+      <p:ext uri="{BB962C8B-B14F-4D97-AF65-F5344CB8AC3E}">
+        <p14:creationId xmlns:p14="http://schemas.microsoft.com/office/powerpoint/2010/main" val="3551302044"/>
+      </p:ext>
+    </p:extLst>
+  </p:cSld>
+  <p:clrMapOvr>
+    <a:masterClrMapping/>
+  </p:clrMapOvr>
+</p:sld>
+</file>
+
 <file path=ppt/tags/tag1.xml><?xml version="1.0" encoding="utf-8"?>
 <p:tagLst xmlns:a="http://schemas.openxmlformats.org/drawingml/2006/main" xmlns:r="http://schemas.openxmlformats.org/officeDocument/2006/relationships" xmlns:p="http://schemas.openxmlformats.org/presentationml/2006/main">
+  <p:tag name="A71660D270C64F5BBB8F27F5E85BE6370" val="HVS\grams;7d788e96-5802-48f7-b87f-ef0226e41b7c;Public;2019-05-03T09:19:29;;HvS|"/>
+  <p:tag name="A71660D270C64F5BBB8F27F5E85BE630" val="1"/>
+  <p:tag name="ISFOXLABELINGONTITLEPAGESET" val="True"/>
+  <p:tag name="ISFOXDOCUMENTCLASSIFICATIONVERSION" val="1"/>
   <p:tag name="ISFOXLABELUSERINTERACTION" val="True"/>
   <p:tag name="ISFOXCLASSIFICATIONID" val="7d788e96-5802-48f7-b87f-ef0226e41b7c"/>
   <p:tag name="ISFOXCLASSIFICATIONNAME" val="Public"/>
   <p:tag name="ISFOXPREFIX" val="HvS"/>
   <p:tag name="ISFOXSHOWCLASSIFICATIONREQUESTDIALOG" val="False"/>
-  <p:tag name="A71660D270C64F5BBB8F27F5E85BE6370" val="HVS\grams;7d788e96-5802-48f7-b87f-ef0226e41b7c;Public;2019-05-03T09:19:29;;HvS|"/>
-  <p:tag name="A71660D270C64F5BBB8F27F5E85BE630" val="1"/>
   <p:tag name="ISFOXOLDCLASSIFICATIONID" val="7d788e96-5802-48f7-b87f-ef0226e41b7c"/>
   <p:tag name="ISFOXCLASSIFICATIONINKEYWORDS" val="Public"/>
   <p:tag name="ISFOXDOVERSIONINGONSAVE" val="0"/>

</xml_diff>

<commit_message>
finished demo documentation, prepared template for (hopefully last) re-rating of risks
</commit_message>
<xml_diff>
--- a/Screenshots.pptx
+++ b/Screenshots.pptx
@@ -243,7 +243,7 @@
           <a:p>
             <a:fld id="{4B5D7A1E-C70D-470C-8980-F4393258158A}" type="datetimeFigureOut">
               <a:rPr lang="en-US" smtClean="0"/>
-              <a:t>6/18/2019</a:t>
+              <a:t>6/26/2019</a:t>
             </a:fld>
             <a:endParaRPr lang="en-US"/>
           </a:p>
@@ -825,11 +825,7 @@
             </a:r>
             <a:r>
               <a:rPr lang="en-US" baseline="0" dirty="0" smtClean="0"/>
-              <a:t> https://</a:t>
-            </a:r>
-            <a:r>
-              <a:rPr lang="en-US" baseline="0" dirty="0" smtClean="0"/>
-              <a:t>docs.microsoft.com/en-us/azure/aks/use-network-policies</a:t>
+              <a:t> https://docs.microsoft.com/en-us/azure/aks/use-network-policies</a:t>
             </a:r>
           </a:p>
           <a:p>
@@ -1016,7 +1012,7 @@
           <a:p>
             <a:fld id="{011329FE-3067-425C-BB62-250DE2A431FA}" type="datetimeFigureOut">
               <a:rPr lang="en-US" smtClean="0"/>
-              <a:t>6/18/2019</a:t>
+              <a:t>6/26/2019</a:t>
             </a:fld>
             <a:endParaRPr lang="en-US"/>
           </a:p>
@@ -1186,7 +1182,7 @@
           <a:p>
             <a:fld id="{011329FE-3067-425C-BB62-250DE2A431FA}" type="datetimeFigureOut">
               <a:rPr lang="en-US" smtClean="0"/>
-              <a:t>6/18/2019</a:t>
+              <a:t>6/26/2019</a:t>
             </a:fld>
             <a:endParaRPr lang="en-US"/>
           </a:p>
@@ -1366,7 +1362,7 @@
           <a:p>
             <a:fld id="{011329FE-3067-425C-BB62-250DE2A431FA}" type="datetimeFigureOut">
               <a:rPr lang="en-US" smtClean="0"/>
-              <a:t>6/18/2019</a:t>
+              <a:t>6/26/2019</a:t>
             </a:fld>
             <a:endParaRPr lang="en-US"/>
           </a:p>
@@ -1536,7 +1532,7 @@
           <a:p>
             <a:fld id="{011329FE-3067-425C-BB62-250DE2A431FA}" type="datetimeFigureOut">
               <a:rPr lang="en-US" smtClean="0"/>
-              <a:t>6/18/2019</a:t>
+              <a:t>6/26/2019</a:t>
             </a:fld>
             <a:endParaRPr lang="en-US"/>
           </a:p>
@@ -1782,7 +1778,7 @@
           <a:p>
             <a:fld id="{011329FE-3067-425C-BB62-250DE2A431FA}" type="datetimeFigureOut">
               <a:rPr lang="en-US" smtClean="0"/>
-              <a:t>6/18/2019</a:t>
+              <a:t>6/26/2019</a:t>
             </a:fld>
             <a:endParaRPr lang="en-US"/>
           </a:p>
@@ -2014,7 +2010,7 @@
           <a:p>
             <a:fld id="{011329FE-3067-425C-BB62-250DE2A431FA}" type="datetimeFigureOut">
               <a:rPr lang="en-US" smtClean="0"/>
-              <a:t>6/18/2019</a:t>
+              <a:t>6/26/2019</a:t>
             </a:fld>
             <a:endParaRPr lang="en-US"/>
           </a:p>
@@ -2381,7 +2377,7 @@
           <a:p>
             <a:fld id="{011329FE-3067-425C-BB62-250DE2A431FA}" type="datetimeFigureOut">
               <a:rPr lang="en-US" smtClean="0"/>
-              <a:t>6/18/2019</a:t>
+              <a:t>6/26/2019</a:t>
             </a:fld>
             <a:endParaRPr lang="en-US"/>
           </a:p>
@@ -2499,7 +2495,7 @@
           <a:p>
             <a:fld id="{011329FE-3067-425C-BB62-250DE2A431FA}" type="datetimeFigureOut">
               <a:rPr lang="en-US" smtClean="0"/>
-              <a:t>6/18/2019</a:t>
+              <a:t>6/26/2019</a:t>
             </a:fld>
             <a:endParaRPr lang="en-US"/>
           </a:p>
@@ -2594,7 +2590,7 @@
           <a:p>
             <a:fld id="{011329FE-3067-425C-BB62-250DE2A431FA}" type="datetimeFigureOut">
               <a:rPr lang="en-US" smtClean="0"/>
-              <a:t>6/18/2019</a:t>
+              <a:t>6/26/2019</a:t>
             </a:fld>
             <a:endParaRPr lang="en-US"/>
           </a:p>
@@ -2871,7 +2867,7 @@
           <a:p>
             <a:fld id="{011329FE-3067-425C-BB62-250DE2A431FA}" type="datetimeFigureOut">
               <a:rPr lang="en-US" smtClean="0"/>
-              <a:t>6/18/2019</a:t>
+              <a:t>6/26/2019</a:t>
             </a:fld>
             <a:endParaRPr lang="en-US"/>
           </a:p>
@@ -3124,7 +3120,7 @@
           <a:p>
             <a:fld id="{011329FE-3067-425C-BB62-250DE2A431FA}" type="datetimeFigureOut">
               <a:rPr lang="en-US" smtClean="0"/>
-              <a:t>6/18/2019</a:t>
+              <a:t>6/26/2019</a:t>
             </a:fld>
             <a:endParaRPr lang="en-US"/>
           </a:p>
@@ -3337,7 +3333,7 @@
           <a:p>
             <a:fld id="{011329FE-3067-425C-BB62-250DE2A431FA}" type="datetimeFigureOut">
               <a:rPr lang="en-US" smtClean="0"/>
-              <a:t>6/18/2019</a:t>
+              <a:t>6/26/2019</a:t>
             </a:fld>
             <a:endParaRPr lang="en-US"/>
           </a:p>
@@ -4140,25 +4136,25 @@
           <p:nvPr>
             <p:extLst>
               <p:ext uri="{D42A27DB-BD31-4B8C-83A1-F6EECF244321}">
-                <p14:modId xmlns:p14="http://schemas.microsoft.com/office/powerpoint/2010/main" val="535224759"/>
+                <p14:modId xmlns:p14="http://schemas.microsoft.com/office/powerpoint/2010/main" val="3309058085"/>
               </p:ext>
             </p:extLst>
           </p:nvPr>
         </p:nvGraphicFramePr>
         <p:xfrm>
-          <a:off x="9331325" y="1120775"/>
-          <a:ext cx="1319213" cy="527050"/>
+          <a:off x="9596438" y="1228725"/>
+          <a:ext cx="787400" cy="311150"/>
         </p:xfrm>
         <a:graphic>
           <a:graphicData uri="http://schemas.openxmlformats.org/presentationml/2006/ole">
             <mc:AlternateContent xmlns:mc="http://schemas.openxmlformats.org/markup-compatibility/2006">
               <mc:Choice xmlns:v="urn:schemas-microsoft-com:vml" Requires="v">
-                <p:oleObj spid="_x0000_s5197" name="Packager Shell Object" showAsIcon="1" r:id="rId4" imgW="1318680" imgH="527400" progId="Package">
+                <p:oleObj spid="_x0000_s5199" name="Packager Shell Object" showAsIcon="1" r:id="rId4" imgW="788040" imgH="311400" progId="Package">
                   <p:embed/>
                 </p:oleObj>
               </mc:Choice>
               <mc:Fallback>
-                <p:oleObj name="Packager Shell Object" showAsIcon="1" r:id="rId4" imgW="1318680" imgH="527400" progId="Package">
+                <p:oleObj name="Packager Shell Object" showAsIcon="1" r:id="rId4" imgW="788040" imgH="311400" progId="Package">
                   <p:embed/>
                   <p:pic>
                     <p:nvPicPr>
@@ -4174,8 +4170,8 @@
                     </p:blipFill>
                     <p:spPr>
                       <a:xfrm>
-                        <a:off x="9331325" y="1120775"/>
-                        <a:ext cx="1319213" cy="527050"/>
+                        <a:off x="9596438" y="1228725"/>
+                        <a:ext cx="787400" cy="311150"/>
                       </a:xfrm>
                       <a:prstGeom prst="rect">
                         <a:avLst/>
@@ -4713,7 +4709,7 @@
           <a:graphicData uri="http://schemas.openxmlformats.org/presentationml/2006/ole">
             <mc:AlternateContent xmlns:mc="http://schemas.openxmlformats.org/markup-compatibility/2006">
               <mc:Choice xmlns:v="urn:schemas-microsoft-com:vml" Requires="v">
-                <p:oleObj spid="_x0000_s4175" name="Packager Shell Object" showAsIcon="1" r:id="rId3" imgW="1396800" imgH="527400" progId="Package">
+                <p:oleObj spid="_x0000_s4177" name="Packager Shell Object" showAsIcon="1" r:id="rId3" imgW="1396800" imgH="527400" progId="Package">
                   <p:embed/>
                 </p:oleObj>
               </mc:Choice>
@@ -4849,7 +4845,7 @@
           <a:graphicData uri="http://schemas.openxmlformats.org/presentationml/2006/ole">
             <mc:AlternateContent xmlns:mc="http://schemas.openxmlformats.org/markup-compatibility/2006">
               <mc:Choice xmlns:v="urn:schemas-microsoft-com:vml" Requires="v">
-                <p:oleObj spid="_x0000_s6216" name="Packager Shell Object" showAsIcon="1" r:id="rId4" imgW="1768320" imgH="527400" progId="Package">
+                <p:oleObj spid="_x0000_s6218" name="Packager Shell Object" showAsIcon="1" r:id="rId4" imgW="1768320" imgH="527400" progId="Package">
                   <p:embed/>
                 </p:oleObj>
               </mc:Choice>
@@ -6469,7 +6465,7 @@
           <a:graphicData uri="http://schemas.openxmlformats.org/presentationml/2006/ole">
             <mc:AlternateContent xmlns:mc="http://schemas.openxmlformats.org/markup-compatibility/2006">
               <mc:Choice xmlns:v="urn:schemas-microsoft-com:vml" Requires="v">
-                <p:oleObj spid="_x0000_s8308" name="Packager Shell Object" showAsIcon="1" r:id="rId3" imgW="1523880" imgH="527400" progId="Package">
+                <p:oleObj spid="_x0000_s8312" name="Packager Shell Object" showAsIcon="1" r:id="rId3" imgW="1523880" imgH="527400" progId="Package">
                   <p:embed/>
                 </p:oleObj>
               </mc:Choice>
@@ -6526,7 +6522,7 @@
           <a:graphicData uri="http://schemas.openxmlformats.org/presentationml/2006/ole">
             <mc:AlternateContent xmlns:mc="http://schemas.openxmlformats.org/markup-compatibility/2006">
               <mc:Choice xmlns:v="urn:schemas-microsoft-com:vml" Requires="v">
-                <p:oleObj spid="_x0000_s8309" name="Packager Shell Object" showAsIcon="1" r:id="rId5" imgW="1934280" imgH="527400" progId="Package">
+                <p:oleObj spid="_x0000_s8313" name="Packager Shell Object" showAsIcon="1" r:id="rId5" imgW="1934280" imgH="527400" progId="Package">
                   <p:embed/>
                 </p:oleObj>
               </mc:Choice>
@@ -6978,7 +6974,7 @@
           <a:graphicData uri="http://schemas.openxmlformats.org/presentationml/2006/ole">
             <mc:AlternateContent xmlns:mc="http://schemas.openxmlformats.org/markup-compatibility/2006">
               <mc:Choice xmlns:v="urn:schemas-microsoft-com:vml" Requires="v">
-                <p:oleObj spid="_x0000_s14368" name="Packager Shell Object" showAsIcon="1" r:id="rId5" imgW="2569320" imgH="527400" progId="Package">
+                <p:oleObj spid="_x0000_s14370" name="Packager Shell Object" showAsIcon="1" r:id="rId5" imgW="2569320" imgH="527400" progId="Package">
                   <p:embed/>
                 </p:oleObj>
               </mc:Choice>
@@ -7082,7 +7078,7 @@
           <a:graphicData uri="http://schemas.openxmlformats.org/presentationml/2006/ole">
             <mc:AlternateContent xmlns:mc="http://schemas.openxmlformats.org/markup-compatibility/2006">
               <mc:Choice xmlns:v="urn:schemas-microsoft-com:vml" Requires="v">
-                <p:oleObj spid="_x0000_s15392" name="Packager Shell Object" showAsIcon="1" r:id="rId4" imgW="2569320" imgH="527400" progId="Package">
+                <p:oleObj spid="_x0000_s15394" name="Packager Shell Object" showAsIcon="1" r:id="rId4" imgW="2569320" imgH="527400" progId="Package">
                   <p:embed/>
                 </p:oleObj>
               </mc:Choice>
@@ -7607,7 +7603,7 @@
           <a:graphicData uri="http://schemas.openxmlformats.org/presentationml/2006/ole">
             <mc:AlternateContent xmlns:mc="http://schemas.openxmlformats.org/markup-compatibility/2006">
               <mc:Choice xmlns:v="urn:schemas-microsoft-com:vml" Requires="v">
-                <p:oleObj spid="_x0000_s16403" name="Packager Shell Object" showAsIcon="1" r:id="rId4" imgW="2510640" imgH="527400" progId="Package">
+                <p:oleObj spid="_x0000_s16405" name="Packager Shell Object" showAsIcon="1" r:id="rId4" imgW="2510640" imgH="527400" progId="Package">
                   <p:embed/>
                 </p:oleObj>
               </mc:Choice>
@@ -8149,7 +8145,7 @@
           <a:graphicData uri="http://schemas.openxmlformats.org/presentationml/2006/ole">
             <mc:AlternateContent xmlns:mc="http://schemas.openxmlformats.org/markup-compatibility/2006">
               <mc:Choice xmlns:v="urn:schemas-microsoft-com:vml" Requires="v">
-                <p:oleObj spid="_x0000_s17424" name="Packager Shell Object" showAsIcon="1" r:id="rId3" imgW="2354400" imgH="527400" progId="Package">
+                <p:oleObj spid="_x0000_s17426" name="Packager Shell Object" showAsIcon="1" r:id="rId3" imgW="2354400" imgH="527400" progId="Package">
                   <p:embed/>
                 </p:oleObj>
               </mc:Choice>
@@ -8523,7 +8519,7 @@
           <a:graphicData uri="http://schemas.openxmlformats.org/presentationml/2006/ole">
             <mc:AlternateContent xmlns:mc="http://schemas.openxmlformats.org/markup-compatibility/2006">
               <mc:Choice xmlns:v="urn:schemas-microsoft-com:vml" Requires="v">
-                <p:oleObj spid="_x0000_s18439" name="Packager Shell Object" showAsIcon="1" r:id="rId4" imgW="2735280" imgH="527400" progId="Package">
+                <p:oleObj spid="_x0000_s18441" name="Packager Shell Object" showAsIcon="1" r:id="rId4" imgW="2735280" imgH="527400" progId="Package">
                   <p:embed/>
                 </p:oleObj>
               </mc:Choice>
@@ -8659,7 +8655,7 @@
           <a:graphicData uri="http://schemas.openxmlformats.org/presentationml/2006/ole">
             <mc:AlternateContent xmlns:mc="http://schemas.openxmlformats.org/markup-compatibility/2006">
               <mc:Choice xmlns:v="urn:schemas-microsoft-com:vml" Requires="v">
-                <p:oleObj spid="_x0000_s19463" name="Packager Shell Object" showAsIcon="1" r:id="rId4" imgW="2735280" imgH="527400" progId="Package">
+                <p:oleObj spid="_x0000_s19465" name="Packager Shell Object" showAsIcon="1" r:id="rId4" imgW="2735280" imgH="527400" progId="Package">
                   <p:embed/>
                 </p:oleObj>
               </mc:Choice>
@@ -9519,7 +9515,7 @@
           <a:graphicData uri="http://schemas.openxmlformats.org/presentationml/2006/ole">
             <mc:AlternateContent xmlns:mc="http://schemas.openxmlformats.org/markup-compatibility/2006">
               <mc:Choice xmlns:v="urn:schemas-microsoft-com:vml" Requires="v">
-                <p:oleObj spid="_x0000_s2234" name="Packager Shell Object" showAsIcon="1" r:id="rId3" imgW="1523880" imgH="527400" progId="Package">
+                <p:oleObj spid="_x0000_s2238" name="Packager Shell Object" showAsIcon="1" r:id="rId3" imgW="1523880" imgH="527400" progId="Package">
                   <p:embed/>
                 </p:oleObj>
               </mc:Choice>
@@ -9576,7 +9572,7 @@
           <a:graphicData uri="http://schemas.openxmlformats.org/presentationml/2006/ole">
             <mc:AlternateContent xmlns:mc="http://schemas.openxmlformats.org/markup-compatibility/2006">
               <mc:Choice xmlns:v="urn:schemas-microsoft-com:vml" Requires="v">
-                <p:oleObj spid="_x0000_s2235" name="Packager Shell Object" showAsIcon="1" r:id="rId5" imgW="1934280" imgH="527400" progId="Package">
+                <p:oleObj spid="_x0000_s2239" name="Packager Shell Object" showAsIcon="1" r:id="rId5" imgW="1934280" imgH="527400" progId="Package">
                   <p:embed/>
                 </p:oleObj>
               </mc:Choice>
@@ -9712,7 +9708,7 @@
           <a:graphicData uri="http://schemas.openxmlformats.org/presentationml/2006/ole">
             <mc:AlternateContent xmlns:mc="http://schemas.openxmlformats.org/markup-compatibility/2006">
               <mc:Choice xmlns:v="urn:schemas-microsoft-com:vml" Requires="v">
-                <p:oleObj spid="_x0000_s3162" name="Packager Shell Object" showAsIcon="1" r:id="rId4" imgW="1914840" imgH="527400" progId="Package">
+                <p:oleObj spid="_x0000_s3164" name="Packager Shell Object" showAsIcon="1" r:id="rId4" imgW="1914840" imgH="527400" progId="Package">
                   <p:embed/>
                 </p:oleObj>
               </mc:Choice>

</xml_diff>

<commit_message>
change to risk estimate - default aks config DOES allow privileged containers!
</commit_message>
<xml_diff>
--- a/Screenshots.pptx
+++ b/Screenshots.pptx
@@ -243,7 +243,7 @@
           <a:p>
             <a:fld id="{4B5D7A1E-C70D-470C-8980-F4393258158A}" type="datetimeFigureOut">
               <a:rPr lang="en-US" smtClean="0"/>
-              <a:t>6/26/2019</a:t>
+              <a:t>7/3/2019</a:t>
             </a:fld>
             <a:endParaRPr lang="en-US"/>
           </a:p>
@@ -1012,7 +1012,7 @@
           <a:p>
             <a:fld id="{011329FE-3067-425C-BB62-250DE2A431FA}" type="datetimeFigureOut">
               <a:rPr lang="en-US" smtClean="0"/>
-              <a:t>6/26/2019</a:t>
+              <a:t>7/3/2019</a:t>
             </a:fld>
             <a:endParaRPr lang="en-US"/>
           </a:p>
@@ -1182,7 +1182,7 @@
           <a:p>
             <a:fld id="{011329FE-3067-425C-BB62-250DE2A431FA}" type="datetimeFigureOut">
               <a:rPr lang="en-US" smtClean="0"/>
-              <a:t>6/26/2019</a:t>
+              <a:t>7/3/2019</a:t>
             </a:fld>
             <a:endParaRPr lang="en-US"/>
           </a:p>
@@ -1362,7 +1362,7 @@
           <a:p>
             <a:fld id="{011329FE-3067-425C-BB62-250DE2A431FA}" type="datetimeFigureOut">
               <a:rPr lang="en-US" smtClean="0"/>
-              <a:t>6/26/2019</a:t>
+              <a:t>7/3/2019</a:t>
             </a:fld>
             <a:endParaRPr lang="en-US"/>
           </a:p>
@@ -1532,7 +1532,7 @@
           <a:p>
             <a:fld id="{011329FE-3067-425C-BB62-250DE2A431FA}" type="datetimeFigureOut">
               <a:rPr lang="en-US" smtClean="0"/>
-              <a:t>6/26/2019</a:t>
+              <a:t>7/3/2019</a:t>
             </a:fld>
             <a:endParaRPr lang="en-US"/>
           </a:p>
@@ -1778,7 +1778,7 @@
           <a:p>
             <a:fld id="{011329FE-3067-425C-BB62-250DE2A431FA}" type="datetimeFigureOut">
               <a:rPr lang="en-US" smtClean="0"/>
-              <a:t>6/26/2019</a:t>
+              <a:t>7/3/2019</a:t>
             </a:fld>
             <a:endParaRPr lang="en-US"/>
           </a:p>
@@ -2010,7 +2010,7 @@
           <a:p>
             <a:fld id="{011329FE-3067-425C-BB62-250DE2A431FA}" type="datetimeFigureOut">
               <a:rPr lang="en-US" smtClean="0"/>
-              <a:t>6/26/2019</a:t>
+              <a:t>7/3/2019</a:t>
             </a:fld>
             <a:endParaRPr lang="en-US"/>
           </a:p>
@@ -2377,7 +2377,7 @@
           <a:p>
             <a:fld id="{011329FE-3067-425C-BB62-250DE2A431FA}" type="datetimeFigureOut">
               <a:rPr lang="en-US" smtClean="0"/>
-              <a:t>6/26/2019</a:t>
+              <a:t>7/3/2019</a:t>
             </a:fld>
             <a:endParaRPr lang="en-US"/>
           </a:p>
@@ -2495,7 +2495,7 @@
           <a:p>
             <a:fld id="{011329FE-3067-425C-BB62-250DE2A431FA}" type="datetimeFigureOut">
               <a:rPr lang="en-US" smtClean="0"/>
-              <a:t>6/26/2019</a:t>
+              <a:t>7/3/2019</a:t>
             </a:fld>
             <a:endParaRPr lang="en-US"/>
           </a:p>
@@ -2590,7 +2590,7 @@
           <a:p>
             <a:fld id="{011329FE-3067-425C-BB62-250DE2A431FA}" type="datetimeFigureOut">
               <a:rPr lang="en-US" smtClean="0"/>
-              <a:t>6/26/2019</a:t>
+              <a:t>7/3/2019</a:t>
             </a:fld>
             <a:endParaRPr lang="en-US"/>
           </a:p>
@@ -2867,7 +2867,7 @@
           <a:p>
             <a:fld id="{011329FE-3067-425C-BB62-250DE2A431FA}" type="datetimeFigureOut">
               <a:rPr lang="en-US" smtClean="0"/>
-              <a:t>6/26/2019</a:t>
+              <a:t>7/3/2019</a:t>
             </a:fld>
             <a:endParaRPr lang="en-US"/>
           </a:p>
@@ -3120,7 +3120,7 @@
           <a:p>
             <a:fld id="{011329FE-3067-425C-BB62-250DE2A431FA}" type="datetimeFigureOut">
               <a:rPr lang="en-US" smtClean="0"/>
-              <a:t>6/26/2019</a:t>
+              <a:t>7/3/2019</a:t>
             </a:fld>
             <a:endParaRPr lang="en-US"/>
           </a:p>
@@ -3333,7 +3333,7 @@
           <a:p>
             <a:fld id="{011329FE-3067-425C-BB62-250DE2A431FA}" type="datetimeFigureOut">
               <a:rPr lang="en-US" smtClean="0"/>
-              <a:t>6/26/2019</a:t>
+              <a:t>7/3/2019</a:t>
             </a:fld>
             <a:endParaRPr lang="en-US"/>
           </a:p>
@@ -4149,7 +4149,7 @@
           <a:graphicData uri="http://schemas.openxmlformats.org/presentationml/2006/ole">
             <mc:AlternateContent xmlns:mc="http://schemas.openxmlformats.org/markup-compatibility/2006">
               <mc:Choice xmlns:v="urn:schemas-microsoft-com:vml" Requires="v">
-                <p:oleObj spid="_x0000_s5199" name="Packager Shell Object" showAsIcon="1" r:id="rId4" imgW="788040" imgH="311400" progId="Package">
+                <p:oleObj spid="_x0000_s5203" name="Packager Shell Object" showAsIcon="1" r:id="rId4" imgW="788040" imgH="311400" progId="Package">
                   <p:embed/>
                 </p:oleObj>
               </mc:Choice>
@@ -4709,7 +4709,7 @@
           <a:graphicData uri="http://schemas.openxmlformats.org/presentationml/2006/ole">
             <mc:AlternateContent xmlns:mc="http://schemas.openxmlformats.org/markup-compatibility/2006">
               <mc:Choice xmlns:v="urn:schemas-microsoft-com:vml" Requires="v">
-                <p:oleObj spid="_x0000_s4177" name="Packager Shell Object" showAsIcon="1" r:id="rId3" imgW="1396800" imgH="527400" progId="Package">
+                <p:oleObj spid="_x0000_s4181" name="Packager Shell Object" showAsIcon="1" r:id="rId3" imgW="1396800" imgH="527400" progId="Package">
                   <p:embed/>
                 </p:oleObj>
               </mc:Choice>
@@ -4845,7 +4845,7 @@
           <a:graphicData uri="http://schemas.openxmlformats.org/presentationml/2006/ole">
             <mc:AlternateContent xmlns:mc="http://schemas.openxmlformats.org/markup-compatibility/2006">
               <mc:Choice xmlns:v="urn:schemas-microsoft-com:vml" Requires="v">
-                <p:oleObj spid="_x0000_s6218" name="Packager Shell Object" showAsIcon="1" r:id="rId4" imgW="1768320" imgH="527400" progId="Package">
+                <p:oleObj spid="_x0000_s6222" name="Packager Shell Object" showAsIcon="1" r:id="rId4" imgW="1768320" imgH="527400" progId="Package">
                   <p:embed/>
                 </p:oleObj>
               </mc:Choice>
@@ -5366,7 +5366,7 @@
         <p:spPr/>
         <p:txBody>
           <a:bodyPr>
-            <a:normAutofit fontScale="47500" lnSpcReduction="20000"/>
+            <a:normAutofit/>
           </a:bodyPr>
           <a:lstStyle/>
           <a:p>
@@ -5431,280 +5431,7 @@
               <a:rPr lang="en-US" dirty="0" smtClean="0"/>
               <a:t>breakout</a:t>
             </a:r>
-          </a:p>
-          <a:p>
-            <a:endParaRPr lang="en-US" dirty="0"/>
-          </a:p>
-          <a:p>
-            <a:r>
-              <a:rPr lang="en-US" dirty="0" err="1" smtClean="0">
-                <a:solidFill>
-                  <a:srgbClr val="FF0000"/>
-                </a:solidFill>
-              </a:rPr>
-              <a:t>oc</a:t>
-            </a:r>
-            <a:r>
-              <a:rPr lang="en-US" dirty="0" smtClean="0">
-                <a:solidFill>
-                  <a:srgbClr val="FF0000"/>
-                </a:solidFill>
-              </a:rPr>
-              <a:t> </a:t>
-            </a:r>
-            <a:r>
-              <a:rPr lang="en-US" dirty="0" err="1" smtClean="0">
-                <a:solidFill>
-                  <a:srgbClr val="FF0000"/>
-                </a:solidFill>
-              </a:rPr>
-              <a:t>adm</a:t>
-            </a:r>
-            <a:r>
-              <a:rPr lang="en-US" dirty="0" smtClean="0">
-                <a:solidFill>
-                  <a:srgbClr val="FF0000"/>
-                </a:solidFill>
-              </a:rPr>
-              <a:t> policy </a:t>
-            </a:r>
-            <a:r>
-              <a:rPr lang="en-US" dirty="0" err="1" smtClean="0">
-                <a:solidFill>
-                  <a:srgbClr val="FF0000"/>
-                </a:solidFill>
-              </a:rPr>
-              <a:t>scc</a:t>
-            </a:r>
-            <a:r>
-              <a:rPr lang="en-US" dirty="0" smtClean="0">
-                <a:solidFill>
-                  <a:srgbClr val="FF0000"/>
-                </a:solidFill>
-              </a:rPr>
-              <a:t>-review -z default -f </a:t>
-            </a:r>
-            <a:r>
-              <a:rPr lang="en-US" dirty="0" err="1" smtClean="0">
-                <a:solidFill>
-                  <a:srgbClr val="FF0000"/>
-                </a:solidFill>
-              </a:rPr>
-              <a:t>container_breakout.yaml</a:t>
-            </a:r>
-            <a:endParaRPr lang="en-US" dirty="0" smtClean="0">
-              <a:solidFill>
-                <a:srgbClr val="FF0000"/>
-              </a:solidFill>
-            </a:endParaRPr>
-          </a:p>
-          <a:p>
-            <a:endParaRPr lang="en-US" dirty="0">
-              <a:solidFill>
-                <a:srgbClr val="FF0000"/>
-              </a:solidFill>
-            </a:endParaRPr>
-          </a:p>
-          <a:p>
-            <a:r>
-              <a:rPr lang="en-US" dirty="0" err="1" smtClean="0">
-                <a:solidFill>
-                  <a:srgbClr val="FF0000"/>
-                </a:solidFill>
-              </a:rPr>
-              <a:t>oc</a:t>
-            </a:r>
-            <a:r>
-              <a:rPr lang="en-US" dirty="0" smtClean="0">
-                <a:solidFill>
-                  <a:srgbClr val="FF0000"/>
-                </a:solidFill>
-              </a:rPr>
-              <a:t> </a:t>
-            </a:r>
-            <a:r>
-              <a:rPr lang="en-US" dirty="0" err="1">
-                <a:solidFill>
-                  <a:srgbClr val="FF0000"/>
-                </a:solidFill>
-              </a:rPr>
-              <a:t>adm</a:t>
-            </a:r>
-            <a:r>
-              <a:rPr lang="en-US" dirty="0">
-                <a:solidFill>
-                  <a:srgbClr val="FF0000"/>
-                </a:solidFill>
-              </a:rPr>
-              <a:t> policy remove-</a:t>
-            </a:r>
-            <a:r>
-              <a:rPr lang="en-US" dirty="0" err="1">
-                <a:solidFill>
-                  <a:srgbClr val="FF0000"/>
-                </a:solidFill>
-              </a:rPr>
-              <a:t>scc</a:t>
-            </a:r>
-            <a:r>
-              <a:rPr lang="en-US" dirty="0">
-                <a:solidFill>
-                  <a:srgbClr val="FF0000"/>
-                </a:solidFill>
-              </a:rPr>
-              <a:t>-from-user privileged -z </a:t>
-            </a:r>
-            <a:r>
-              <a:rPr lang="en-US" dirty="0" smtClean="0">
-                <a:solidFill>
-                  <a:srgbClr val="FF0000"/>
-                </a:solidFill>
-              </a:rPr>
-              <a:t>default</a:t>
-            </a:r>
-          </a:p>
-          <a:p>
-            <a:endParaRPr lang="en-US" dirty="0" smtClean="0">
-              <a:solidFill>
-                <a:srgbClr val="FF0000"/>
-              </a:solidFill>
-            </a:endParaRPr>
-          </a:p>
-          <a:p>
-            <a:r>
-              <a:rPr lang="en-US" dirty="0" err="1">
-                <a:solidFill>
-                  <a:srgbClr val="FF0000"/>
-                </a:solidFill>
-              </a:rPr>
-              <a:t>oc</a:t>
-            </a:r>
-            <a:r>
-              <a:rPr lang="en-US" dirty="0">
-                <a:solidFill>
-                  <a:srgbClr val="FF0000"/>
-                </a:solidFill>
-              </a:rPr>
-              <a:t> </a:t>
-            </a:r>
-            <a:r>
-              <a:rPr lang="en-US" dirty="0" err="1">
-                <a:solidFill>
-                  <a:srgbClr val="FF0000"/>
-                </a:solidFill>
-              </a:rPr>
-              <a:t>adm</a:t>
-            </a:r>
-            <a:r>
-              <a:rPr lang="en-US" dirty="0">
-                <a:solidFill>
-                  <a:srgbClr val="FF0000"/>
-                </a:solidFill>
-              </a:rPr>
-              <a:t> policy </a:t>
-            </a:r>
-            <a:r>
-              <a:rPr lang="en-US" dirty="0" err="1">
-                <a:solidFill>
-                  <a:srgbClr val="FF0000"/>
-                </a:solidFill>
-              </a:rPr>
-              <a:t>scc</a:t>
-            </a:r>
-            <a:r>
-              <a:rPr lang="en-US" dirty="0">
-                <a:solidFill>
-                  <a:srgbClr val="FF0000"/>
-                </a:solidFill>
-              </a:rPr>
-              <a:t>-review -z default -f </a:t>
-            </a:r>
-            <a:r>
-              <a:rPr lang="en-US" dirty="0" err="1">
-                <a:solidFill>
-                  <a:srgbClr val="FF0000"/>
-                </a:solidFill>
-              </a:rPr>
-              <a:t>container_breakout.yaml</a:t>
-            </a:r>
-            <a:endParaRPr lang="en-US" dirty="0">
-              <a:solidFill>
-                <a:srgbClr val="FF0000"/>
-              </a:solidFill>
-            </a:endParaRPr>
-          </a:p>
-          <a:p>
-            <a:pPr marL="0" indent="0">
-              <a:buNone/>
-            </a:pPr>
-            <a:endParaRPr lang="en-US" dirty="0" smtClean="0">
-              <a:solidFill>
-                <a:srgbClr val="FF0000"/>
-              </a:solidFill>
-            </a:endParaRPr>
-          </a:p>
-          <a:p>
-            <a:pPr marL="0" indent="0">
-              <a:buNone/>
-            </a:pPr>
-            <a:r>
-              <a:rPr lang="en-US" dirty="0" smtClean="0">
-                <a:solidFill>
-                  <a:srgbClr val="FF0000"/>
-                </a:solidFill>
-              </a:rPr>
-              <a:t>(to add again: )</a:t>
-            </a:r>
-          </a:p>
-          <a:p>
-            <a:r>
-              <a:rPr lang="en-US" dirty="0" err="1" smtClean="0">
-                <a:solidFill>
-                  <a:srgbClr val="FF0000"/>
-                </a:solidFill>
-              </a:rPr>
-              <a:t>oc</a:t>
-            </a:r>
-            <a:r>
-              <a:rPr lang="en-US" dirty="0" smtClean="0">
-                <a:solidFill>
-                  <a:srgbClr val="FF0000"/>
-                </a:solidFill>
-              </a:rPr>
-              <a:t> </a:t>
-            </a:r>
-            <a:r>
-              <a:rPr lang="en-US" dirty="0" err="1">
-                <a:solidFill>
-                  <a:srgbClr val="FF0000"/>
-                </a:solidFill>
-              </a:rPr>
-              <a:t>adm</a:t>
-            </a:r>
-            <a:r>
-              <a:rPr lang="en-US" dirty="0">
-                <a:solidFill>
-                  <a:srgbClr val="FF0000"/>
-                </a:solidFill>
-              </a:rPr>
-              <a:t> policy add-</a:t>
-            </a:r>
-            <a:r>
-              <a:rPr lang="en-US" dirty="0" err="1">
-                <a:solidFill>
-                  <a:srgbClr val="FF0000"/>
-                </a:solidFill>
-              </a:rPr>
-              <a:t>scc</a:t>
-            </a:r>
-            <a:r>
-              <a:rPr lang="en-US" dirty="0">
-                <a:solidFill>
-                  <a:srgbClr val="FF0000"/>
-                </a:solidFill>
-              </a:rPr>
-              <a:t>-to-user privileged -z default</a:t>
-            </a:r>
+            <a:endParaRPr lang="en-US" dirty="0" smtClean="0"/>
           </a:p>
         </p:txBody>
       </p:sp>
@@ -6452,25 +6179,25 @@
           <p:nvPr>
             <p:extLst>
               <p:ext uri="{D42A27DB-BD31-4B8C-83A1-F6EECF244321}">
-                <p14:modId xmlns:p14="http://schemas.microsoft.com/office/powerpoint/2010/main" val="798111986"/>
+                <p14:modId xmlns:p14="http://schemas.microsoft.com/office/powerpoint/2010/main" val="2888140617"/>
               </p:ext>
             </p:extLst>
           </p:nvPr>
         </p:nvGraphicFramePr>
         <p:xfrm>
-          <a:off x="5131550" y="3155933"/>
-          <a:ext cx="1524000" cy="527050"/>
+          <a:off x="5121275" y="3155950"/>
+          <a:ext cx="1543050" cy="527050"/>
         </p:xfrm>
         <a:graphic>
           <a:graphicData uri="http://schemas.openxmlformats.org/presentationml/2006/ole">
             <mc:AlternateContent xmlns:mc="http://schemas.openxmlformats.org/markup-compatibility/2006">
               <mc:Choice xmlns:v="urn:schemas-microsoft-com:vml" Requires="v">
-                <p:oleObj spid="_x0000_s8312" name="Packager Shell Object" showAsIcon="1" r:id="rId3" imgW="1523880" imgH="527400" progId="Package">
+                <p:oleObj spid="_x0000_s8320" name="Packager Shell Object" showAsIcon="1" r:id="rId3" imgW="1543320" imgH="527400" progId="Package">
                   <p:embed/>
                 </p:oleObj>
               </mc:Choice>
               <mc:Fallback>
-                <p:oleObj name="Packager Shell Object" showAsIcon="1" r:id="rId3" imgW="1523880" imgH="527400" progId="Package">
+                <p:oleObj name="Packager Shell Object" showAsIcon="1" r:id="rId3" imgW="1543320" imgH="527400" progId="Package">
                   <p:embed/>
                   <p:pic>
                     <p:nvPicPr>
@@ -6486,8 +6213,8 @@
                     </p:blipFill>
                     <p:spPr>
                       <a:xfrm>
-                        <a:off x="5131550" y="3155933"/>
-                        <a:ext cx="1524000" cy="527050"/>
+                        <a:off x="5121275" y="3155950"/>
+                        <a:ext cx="1543050" cy="527050"/>
                       </a:xfrm>
                       <a:prstGeom prst="rect">
                         <a:avLst/>
@@ -6509,25 +6236,25 @@
           <p:nvPr>
             <p:extLst>
               <p:ext uri="{D42A27DB-BD31-4B8C-83A1-F6EECF244321}">
-                <p14:modId xmlns:p14="http://schemas.microsoft.com/office/powerpoint/2010/main" val="2996175705"/>
+                <p14:modId xmlns:p14="http://schemas.microsoft.com/office/powerpoint/2010/main" val="3574235061"/>
               </p:ext>
             </p:extLst>
           </p:nvPr>
         </p:nvGraphicFramePr>
         <p:xfrm>
-          <a:off x="7697300" y="3155933"/>
-          <a:ext cx="1933575" cy="527050"/>
+          <a:off x="7683500" y="3155950"/>
+          <a:ext cx="1963738" cy="527050"/>
         </p:xfrm>
         <a:graphic>
           <a:graphicData uri="http://schemas.openxmlformats.org/presentationml/2006/ole">
             <mc:AlternateContent xmlns:mc="http://schemas.openxmlformats.org/markup-compatibility/2006">
               <mc:Choice xmlns:v="urn:schemas-microsoft-com:vml" Requires="v">
-                <p:oleObj spid="_x0000_s8313" name="Packager Shell Object" showAsIcon="1" r:id="rId5" imgW="1934280" imgH="527400" progId="Package">
+                <p:oleObj spid="_x0000_s8321" name="Packager Shell Object" showAsIcon="1" r:id="rId5" imgW="1963440" imgH="527400" progId="Package">
                   <p:embed/>
                 </p:oleObj>
               </mc:Choice>
               <mc:Fallback>
-                <p:oleObj name="Packager Shell Object" showAsIcon="1" r:id="rId5" imgW="1934280" imgH="527400" progId="Package">
+                <p:oleObj name="Packager Shell Object" showAsIcon="1" r:id="rId5" imgW="1963440" imgH="527400" progId="Package">
                   <p:embed/>
                   <p:pic>
                     <p:nvPicPr>
@@ -6543,8 +6270,8 @@
                     </p:blipFill>
                     <p:spPr>
                       <a:xfrm>
-                        <a:off x="7697300" y="3155933"/>
-                        <a:ext cx="1933575" cy="527050"/>
+                        <a:off x="7683500" y="3155950"/>
+                        <a:ext cx="1963738" cy="527050"/>
                       </a:xfrm>
                       <a:prstGeom prst="rect">
                         <a:avLst/>
@@ -6623,7 +6350,7 @@
         <p:spPr/>
         <p:txBody>
           <a:bodyPr>
-            <a:normAutofit fontScale="92500" lnSpcReduction="20000"/>
+            <a:normAutofit fontScale="92500" lnSpcReduction="10000"/>
           </a:bodyPr>
           <a:lstStyle/>
           <a:p>
@@ -6850,24 +6577,28 @@
             <a:endParaRPr lang="en-US" dirty="0" smtClean="0"/>
           </a:p>
           <a:p>
-            <a:r>
-              <a:rPr lang="en-US" dirty="0" smtClean="0"/>
-              <a:t>Check why:</a:t>
-            </a:r>
-          </a:p>
-          <a:p>
-            <a:pPr lvl="1"/>
-            <a:r>
-              <a:rPr lang="en-US" dirty="0" err="1" smtClean="0"/>
-              <a:t>Kubectl</a:t>
-            </a:r>
-            <a:r>
-              <a:rPr lang="en-US" dirty="0" smtClean="0"/>
-              <a:t> get </a:t>
+            <a:pPr marL="0" indent="0">
+              <a:buNone/>
+            </a:pPr>
+            <a:r>
+              <a:rPr lang="en-US" smtClean="0"/>
+              <a:t>(OPTIONAL: Check why - Kubectl</a:t>
+            </a:r>
+            <a:r>
+              <a:rPr lang="en-US" dirty="0" smtClean="0"/>
+              <a:t> </a:t>
+            </a:r>
+            <a:r>
+              <a:rPr lang="en-US" dirty="0" smtClean="0"/>
+              <a:t>get </a:t>
             </a:r>
             <a:r>
               <a:rPr lang="en-US" dirty="0" err="1" smtClean="0"/>
               <a:t>psp</a:t>
+            </a:r>
+            <a:r>
+              <a:rPr lang="en-US" dirty="0" smtClean="0"/>
+              <a:t>)</a:t>
             </a:r>
             <a:endParaRPr lang="en-US" dirty="0" smtClean="0"/>
           </a:p>
@@ -6961,7 +6692,7 @@
           <p:nvPr>
             <p:extLst>
               <p:ext uri="{D42A27DB-BD31-4B8C-83A1-F6EECF244321}">
-                <p14:modId xmlns:p14="http://schemas.microsoft.com/office/powerpoint/2010/main" val="900830543"/>
+                <p14:modId xmlns:p14="http://schemas.microsoft.com/office/powerpoint/2010/main" val="2960944034"/>
               </p:ext>
             </p:extLst>
           </p:nvPr>
@@ -6974,7 +6705,7 @@
           <a:graphicData uri="http://schemas.openxmlformats.org/presentationml/2006/ole">
             <mc:AlternateContent xmlns:mc="http://schemas.openxmlformats.org/markup-compatibility/2006">
               <mc:Choice xmlns:v="urn:schemas-microsoft-com:vml" Requires="v">
-                <p:oleObj spid="_x0000_s14370" name="Packager Shell Object" showAsIcon="1" r:id="rId5" imgW="2569320" imgH="527400" progId="Package">
+                <p:oleObj spid="_x0000_s14374" name="Packager Shell Object" showAsIcon="1" r:id="rId5" imgW="2569320" imgH="527400" progId="Package">
                   <p:embed/>
                 </p:oleObj>
               </mc:Choice>
@@ -7078,7 +6809,7 @@
           <a:graphicData uri="http://schemas.openxmlformats.org/presentationml/2006/ole">
             <mc:AlternateContent xmlns:mc="http://schemas.openxmlformats.org/markup-compatibility/2006">
               <mc:Choice xmlns:v="urn:schemas-microsoft-com:vml" Requires="v">
-                <p:oleObj spid="_x0000_s15394" name="Packager Shell Object" showAsIcon="1" r:id="rId4" imgW="2569320" imgH="527400" progId="Package">
+                <p:oleObj spid="_x0000_s15398" name="Packager Shell Object" showAsIcon="1" r:id="rId4" imgW="2569320" imgH="527400" progId="Package">
                   <p:embed/>
                 </p:oleObj>
               </mc:Choice>
@@ -7603,7 +7334,7 @@
           <a:graphicData uri="http://schemas.openxmlformats.org/presentationml/2006/ole">
             <mc:AlternateContent xmlns:mc="http://schemas.openxmlformats.org/markup-compatibility/2006">
               <mc:Choice xmlns:v="urn:schemas-microsoft-com:vml" Requires="v">
-                <p:oleObj spid="_x0000_s16405" name="Packager Shell Object" showAsIcon="1" r:id="rId4" imgW="2510640" imgH="527400" progId="Package">
+                <p:oleObj spid="_x0000_s16409" name="Packager Shell Object" showAsIcon="1" r:id="rId4" imgW="2510640" imgH="527400" progId="Package">
                   <p:embed/>
                 </p:oleObj>
               </mc:Choice>
@@ -8145,7 +7876,7 @@
           <a:graphicData uri="http://schemas.openxmlformats.org/presentationml/2006/ole">
             <mc:AlternateContent xmlns:mc="http://schemas.openxmlformats.org/markup-compatibility/2006">
               <mc:Choice xmlns:v="urn:schemas-microsoft-com:vml" Requires="v">
-                <p:oleObj spid="_x0000_s17426" name="Packager Shell Object" showAsIcon="1" r:id="rId3" imgW="2354400" imgH="527400" progId="Package">
+                <p:oleObj spid="_x0000_s17430" name="Packager Shell Object" showAsIcon="1" r:id="rId3" imgW="2354400" imgH="527400" progId="Package">
                   <p:embed/>
                 </p:oleObj>
               </mc:Choice>
@@ -8519,7 +8250,7 @@
           <a:graphicData uri="http://schemas.openxmlformats.org/presentationml/2006/ole">
             <mc:AlternateContent xmlns:mc="http://schemas.openxmlformats.org/markup-compatibility/2006">
               <mc:Choice xmlns:v="urn:schemas-microsoft-com:vml" Requires="v">
-                <p:oleObj spid="_x0000_s18441" name="Packager Shell Object" showAsIcon="1" r:id="rId4" imgW="2735280" imgH="527400" progId="Package">
+                <p:oleObj spid="_x0000_s18445" name="Packager Shell Object" showAsIcon="1" r:id="rId4" imgW="2735280" imgH="527400" progId="Package">
                   <p:embed/>
                 </p:oleObj>
               </mc:Choice>
@@ -8655,7 +8386,7 @@
           <a:graphicData uri="http://schemas.openxmlformats.org/presentationml/2006/ole">
             <mc:AlternateContent xmlns:mc="http://schemas.openxmlformats.org/markup-compatibility/2006">
               <mc:Choice xmlns:v="urn:schemas-microsoft-com:vml" Requires="v">
-                <p:oleObj spid="_x0000_s19465" name="Packager Shell Object" showAsIcon="1" r:id="rId4" imgW="2735280" imgH="527400" progId="Package">
+                <p:oleObj spid="_x0000_s19469" name="Packager Shell Object" showAsIcon="1" r:id="rId4" imgW="2735280" imgH="527400" progId="Package">
                   <p:embed/>
                 </p:oleObj>
               </mc:Choice>
@@ -9515,7 +9246,7 @@
           <a:graphicData uri="http://schemas.openxmlformats.org/presentationml/2006/ole">
             <mc:AlternateContent xmlns:mc="http://schemas.openxmlformats.org/markup-compatibility/2006">
               <mc:Choice xmlns:v="urn:schemas-microsoft-com:vml" Requires="v">
-                <p:oleObj spid="_x0000_s2238" name="Packager Shell Object" showAsIcon="1" r:id="rId3" imgW="1523880" imgH="527400" progId="Package">
+                <p:oleObj spid="_x0000_s2246" name="Packager Shell Object" showAsIcon="1" r:id="rId3" imgW="1523880" imgH="527400" progId="Package">
                   <p:embed/>
                 </p:oleObj>
               </mc:Choice>
@@ -9572,7 +9303,7 @@
           <a:graphicData uri="http://schemas.openxmlformats.org/presentationml/2006/ole">
             <mc:AlternateContent xmlns:mc="http://schemas.openxmlformats.org/markup-compatibility/2006">
               <mc:Choice xmlns:v="urn:schemas-microsoft-com:vml" Requires="v">
-                <p:oleObj spid="_x0000_s2239" name="Packager Shell Object" showAsIcon="1" r:id="rId5" imgW="1934280" imgH="527400" progId="Package">
+                <p:oleObj spid="_x0000_s2247" name="Packager Shell Object" showAsIcon="1" r:id="rId5" imgW="1934280" imgH="527400" progId="Package">
                   <p:embed/>
                 </p:oleObj>
               </mc:Choice>
@@ -9708,7 +9439,7 @@
           <a:graphicData uri="http://schemas.openxmlformats.org/presentationml/2006/ole">
             <mc:AlternateContent xmlns:mc="http://schemas.openxmlformats.org/markup-compatibility/2006">
               <mc:Choice xmlns:v="urn:schemas-microsoft-com:vml" Requires="v">
-                <p:oleObj spid="_x0000_s3164" name="Packager Shell Object" showAsIcon="1" r:id="rId4" imgW="1914840" imgH="527400" progId="Package">
+                <p:oleObj spid="_x0000_s3168" name="Packager Shell Object" showAsIcon="1" r:id="rId4" imgW="1914840" imgH="527400" progId="Package">
                   <p:embed/>
                 </p:oleObj>
               </mc:Choice>
@@ -9835,11 +9566,11 @@
   <p:tag name="ISFOXLABELINGONTITLEPAGESET" val="True"/>
   <p:tag name="ISFOXDOCUMENTCLASSIFICATIONVERSION" val="1"/>
   <p:tag name="ISFOXLABELUSERINTERACTION" val="True"/>
-  <p:tag name="ISFOXOLDCLASSIFICATIONID" val="00000000-0000-0000-0000-000000000000"/>
   <p:tag name="ISFOXCLASSIFICATIONID" val="7d788e96-5802-48f7-b87f-ef0226e41b7c"/>
   <p:tag name="ISFOXCLASSIFICATIONNAME" val="Public"/>
   <p:tag name="ISFOXPREFIX" val="HvS"/>
   <p:tag name="ISFOXSHOWCLASSIFICATIONREQUESTDIALOG" val="False"/>
+  <p:tag name="ISFOXOLDCLASSIFICATIONID" val="7d788e96-5802-48f7-b87f-ef0226e41b7c"/>
   <p:tag name="ISFOXCLASSIFICATIONINKEYWORDS" val="Public"/>
   <p:tag name="ISFOXDOVERSIONINGONSAVE" val="0"/>
 </p:tagLst>

</xml_diff>

<commit_message>
added appendix with proof screenshots, cleaned up practical part latex source
</commit_message>
<xml_diff>
--- a/Screenshots.pptx
+++ b/Screenshots.pptx
@@ -5,7 +5,7 @@
     <p:sldMasterId id="2147483648" r:id="rId1"/>
   </p:sldMasterIdLst>
   <p:notesMasterIdLst>
-    <p:notesMasterId r:id="rId46"/>
+    <p:notesMasterId r:id="rId45"/>
   </p:notesMasterIdLst>
   <p:sldIdLst>
     <p:sldId id="260" r:id="rId2"/>
@@ -51,12 +51,11 @@
     <p:sldId id="274" r:id="rId42"/>
     <p:sldId id="300" r:id="rId43"/>
     <p:sldId id="301" r:id="rId44"/>
-    <p:sldId id="299" r:id="rId45"/>
   </p:sldIdLst>
   <p:sldSz cx="12192000" cy="6858000"/>
   <p:notesSz cx="6858000" cy="9144000"/>
   <p:custDataLst>
-    <p:tags r:id="rId47"/>
+    <p:tags r:id="rId46"/>
   </p:custDataLst>
   <p:defaultTextStyle>
     <a:defPPr>
@@ -243,7 +242,7 @@
           <a:p>
             <a:fld id="{4B5D7A1E-C70D-470C-8980-F4393258158A}" type="datetimeFigureOut">
               <a:rPr lang="en-US" smtClean="0"/>
-              <a:t>7/3/2019</a:t>
+              <a:t>7/16/2019</a:t>
             </a:fld>
             <a:endParaRPr lang="en-US"/>
           </a:p>
@@ -1012,7 +1011,7 @@
           <a:p>
             <a:fld id="{011329FE-3067-425C-BB62-250DE2A431FA}" type="datetimeFigureOut">
               <a:rPr lang="en-US" smtClean="0"/>
-              <a:t>7/3/2019</a:t>
+              <a:t>7/16/2019</a:t>
             </a:fld>
             <a:endParaRPr lang="en-US"/>
           </a:p>
@@ -1182,7 +1181,7 @@
           <a:p>
             <a:fld id="{011329FE-3067-425C-BB62-250DE2A431FA}" type="datetimeFigureOut">
               <a:rPr lang="en-US" smtClean="0"/>
-              <a:t>7/3/2019</a:t>
+              <a:t>7/16/2019</a:t>
             </a:fld>
             <a:endParaRPr lang="en-US"/>
           </a:p>
@@ -1362,7 +1361,7 @@
           <a:p>
             <a:fld id="{011329FE-3067-425C-BB62-250DE2A431FA}" type="datetimeFigureOut">
               <a:rPr lang="en-US" smtClean="0"/>
-              <a:t>7/3/2019</a:t>
+              <a:t>7/16/2019</a:t>
             </a:fld>
             <a:endParaRPr lang="en-US"/>
           </a:p>
@@ -1532,7 +1531,7 @@
           <a:p>
             <a:fld id="{011329FE-3067-425C-BB62-250DE2A431FA}" type="datetimeFigureOut">
               <a:rPr lang="en-US" smtClean="0"/>
-              <a:t>7/3/2019</a:t>
+              <a:t>7/16/2019</a:t>
             </a:fld>
             <a:endParaRPr lang="en-US"/>
           </a:p>
@@ -1778,7 +1777,7 @@
           <a:p>
             <a:fld id="{011329FE-3067-425C-BB62-250DE2A431FA}" type="datetimeFigureOut">
               <a:rPr lang="en-US" smtClean="0"/>
-              <a:t>7/3/2019</a:t>
+              <a:t>7/16/2019</a:t>
             </a:fld>
             <a:endParaRPr lang="en-US"/>
           </a:p>
@@ -2010,7 +2009,7 @@
           <a:p>
             <a:fld id="{011329FE-3067-425C-BB62-250DE2A431FA}" type="datetimeFigureOut">
               <a:rPr lang="en-US" smtClean="0"/>
-              <a:t>7/3/2019</a:t>
+              <a:t>7/16/2019</a:t>
             </a:fld>
             <a:endParaRPr lang="en-US"/>
           </a:p>
@@ -2377,7 +2376,7 @@
           <a:p>
             <a:fld id="{011329FE-3067-425C-BB62-250DE2A431FA}" type="datetimeFigureOut">
               <a:rPr lang="en-US" smtClean="0"/>
-              <a:t>7/3/2019</a:t>
+              <a:t>7/16/2019</a:t>
             </a:fld>
             <a:endParaRPr lang="en-US"/>
           </a:p>
@@ -2495,7 +2494,7 @@
           <a:p>
             <a:fld id="{011329FE-3067-425C-BB62-250DE2A431FA}" type="datetimeFigureOut">
               <a:rPr lang="en-US" smtClean="0"/>
-              <a:t>7/3/2019</a:t>
+              <a:t>7/16/2019</a:t>
             </a:fld>
             <a:endParaRPr lang="en-US"/>
           </a:p>
@@ -2590,7 +2589,7 @@
           <a:p>
             <a:fld id="{011329FE-3067-425C-BB62-250DE2A431FA}" type="datetimeFigureOut">
               <a:rPr lang="en-US" smtClean="0"/>
-              <a:t>7/3/2019</a:t>
+              <a:t>7/16/2019</a:t>
             </a:fld>
             <a:endParaRPr lang="en-US"/>
           </a:p>
@@ -2867,7 +2866,7 @@
           <a:p>
             <a:fld id="{011329FE-3067-425C-BB62-250DE2A431FA}" type="datetimeFigureOut">
               <a:rPr lang="en-US" smtClean="0"/>
-              <a:t>7/3/2019</a:t>
+              <a:t>7/16/2019</a:t>
             </a:fld>
             <a:endParaRPr lang="en-US"/>
           </a:p>
@@ -3120,7 +3119,7 @@
           <a:p>
             <a:fld id="{011329FE-3067-425C-BB62-250DE2A431FA}" type="datetimeFigureOut">
               <a:rPr lang="en-US" smtClean="0"/>
-              <a:t>7/3/2019</a:t>
+              <a:t>7/16/2019</a:t>
             </a:fld>
             <a:endParaRPr lang="en-US"/>
           </a:p>
@@ -3333,7 +3332,7 @@
           <a:p>
             <a:fld id="{011329FE-3067-425C-BB62-250DE2A431FA}" type="datetimeFigureOut">
               <a:rPr lang="en-US" smtClean="0"/>
-              <a:t>7/3/2019</a:t>
+              <a:t>7/16/2019</a:t>
             </a:fld>
             <a:endParaRPr lang="en-US"/>
           </a:p>
@@ -4149,7 +4148,7 @@
           <a:graphicData uri="http://schemas.openxmlformats.org/presentationml/2006/ole">
             <mc:AlternateContent xmlns:mc="http://schemas.openxmlformats.org/markup-compatibility/2006">
               <mc:Choice xmlns:v="urn:schemas-microsoft-com:vml" Requires="v">
-                <p:oleObj spid="_x0000_s5203" name="Packager Shell Object" showAsIcon="1" r:id="rId4" imgW="788040" imgH="311400" progId="Package">
+                <p:oleObj spid="_x0000_s5205" name="Packager Shell Object" showAsIcon="1" r:id="rId4" imgW="788040" imgH="311400" progId="Package">
                   <p:embed/>
                 </p:oleObj>
               </mc:Choice>
@@ -4709,7 +4708,7 @@
           <a:graphicData uri="http://schemas.openxmlformats.org/presentationml/2006/ole">
             <mc:AlternateContent xmlns:mc="http://schemas.openxmlformats.org/markup-compatibility/2006">
               <mc:Choice xmlns:v="urn:schemas-microsoft-com:vml" Requires="v">
-                <p:oleObj spid="_x0000_s4181" name="Packager Shell Object" showAsIcon="1" r:id="rId3" imgW="1396800" imgH="527400" progId="Package">
+                <p:oleObj spid="_x0000_s4183" name="Packager Shell Object" showAsIcon="1" r:id="rId3" imgW="1396800" imgH="527400" progId="Package">
                   <p:embed/>
                 </p:oleObj>
               </mc:Choice>
@@ -4845,7 +4844,7 @@
           <a:graphicData uri="http://schemas.openxmlformats.org/presentationml/2006/ole">
             <mc:AlternateContent xmlns:mc="http://schemas.openxmlformats.org/markup-compatibility/2006">
               <mc:Choice xmlns:v="urn:schemas-microsoft-com:vml" Requires="v">
-                <p:oleObj spid="_x0000_s6222" name="Packager Shell Object" showAsIcon="1" r:id="rId4" imgW="1768320" imgH="527400" progId="Package">
+                <p:oleObj spid="_x0000_s6224" name="Packager Shell Object" showAsIcon="1" r:id="rId4" imgW="1768320" imgH="527400" progId="Package">
                   <p:embed/>
                 </p:oleObj>
               </mc:Choice>
@@ -5431,7 +5430,6 @@
               <a:rPr lang="en-US" dirty="0" smtClean="0"/>
               <a:t>breakout</a:t>
             </a:r>
-            <a:endParaRPr lang="en-US" dirty="0" smtClean="0"/>
           </a:p>
         </p:txBody>
       </p:sp>
@@ -6192,7 +6190,7 @@
           <a:graphicData uri="http://schemas.openxmlformats.org/presentationml/2006/ole">
             <mc:AlternateContent xmlns:mc="http://schemas.openxmlformats.org/markup-compatibility/2006">
               <mc:Choice xmlns:v="urn:schemas-microsoft-com:vml" Requires="v">
-                <p:oleObj spid="_x0000_s8320" name="Packager Shell Object" showAsIcon="1" r:id="rId3" imgW="1543320" imgH="527400" progId="Package">
+                <p:oleObj spid="_x0000_s8324" name="Packager Shell Object" showAsIcon="1" r:id="rId3" imgW="1543320" imgH="527400" progId="Package">
                   <p:embed/>
                 </p:oleObj>
               </mc:Choice>
@@ -6249,7 +6247,7 @@
           <a:graphicData uri="http://schemas.openxmlformats.org/presentationml/2006/ole">
             <mc:AlternateContent xmlns:mc="http://schemas.openxmlformats.org/markup-compatibility/2006">
               <mc:Choice xmlns:v="urn:schemas-microsoft-com:vml" Requires="v">
-                <p:oleObj spid="_x0000_s8321" name="Packager Shell Object" showAsIcon="1" r:id="rId5" imgW="1963440" imgH="527400" progId="Package">
+                <p:oleObj spid="_x0000_s8325" name="Packager Shell Object" showAsIcon="1" r:id="rId5" imgW="1963440" imgH="527400" progId="Package">
                   <p:embed/>
                 </p:oleObj>
               </mc:Choice>
@@ -6586,11 +6584,7 @@
             </a:r>
             <a:r>
               <a:rPr lang="en-US" dirty="0" smtClean="0"/>
-              <a:t> </a:t>
-            </a:r>
-            <a:r>
-              <a:rPr lang="en-US" dirty="0" smtClean="0"/>
-              <a:t>get </a:t>
+              <a:t> get </a:t>
             </a:r>
             <a:r>
               <a:rPr lang="en-US" dirty="0" err="1" smtClean="0"/>
@@ -6600,7 +6594,6 @@
               <a:rPr lang="en-US" dirty="0" smtClean="0"/>
               <a:t>)</a:t>
             </a:r>
-            <a:endParaRPr lang="en-US" dirty="0" smtClean="0"/>
           </a:p>
         </p:txBody>
       </p:sp>
@@ -6705,7 +6698,7 @@
           <a:graphicData uri="http://schemas.openxmlformats.org/presentationml/2006/ole">
             <mc:AlternateContent xmlns:mc="http://schemas.openxmlformats.org/markup-compatibility/2006">
               <mc:Choice xmlns:v="urn:schemas-microsoft-com:vml" Requires="v">
-                <p:oleObj spid="_x0000_s14374" name="Packager Shell Object" showAsIcon="1" r:id="rId5" imgW="2569320" imgH="527400" progId="Package">
+                <p:oleObj spid="_x0000_s14376" name="Packager Shell Object" showAsIcon="1" r:id="rId5" imgW="2569320" imgH="527400" progId="Package">
                   <p:embed/>
                 </p:oleObj>
               </mc:Choice>
@@ -6809,7 +6802,7 @@
           <a:graphicData uri="http://schemas.openxmlformats.org/presentationml/2006/ole">
             <mc:AlternateContent xmlns:mc="http://schemas.openxmlformats.org/markup-compatibility/2006">
               <mc:Choice xmlns:v="urn:schemas-microsoft-com:vml" Requires="v">
-                <p:oleObj spid="_x0000_s15398" name="Packager Shell Object" showAsIcon="1" r:id="rId4" imgW="2569320" imgH="527400" progId="Package">
+                <p:oleObj spid="_x0000_s15400" name="Packager Shell Object" showAsIcon="1" r:id="rId4" imgW="2569320" imgH="527400" progId="Package">
                   <p:embed/>
                 </p:oleObj>
               </mc:Choice>
@@ -7334,7 +7327,7 @@
           <a:graphicData uri="http://schemas.openxmlformats.org/presentationml/2006/ole">
             <mc:AlternateContent xmlns:mc="http://schemas.openxmlformats.org/markup-compatibility/2006">
               <mc:Choice xmlns:v="urn:schemas-microsoft-com:vml" Requires="v">
-                <p:oleObj spid="_x0000_s16409" name="Packager Shell Object" showAsIcon="1" r:id="rId4" imgW="2510640" imgH="527400" progId="Package">
+                <p:oleObj spid="_x0000_s16411" name="Packager Shell Object" showAsIcon="1" r:id="rId4" imgW="2510640" imgH="527400" progId="Package">
                   <p:embed/>
                 </p:oleObj>
               </mc:Choice>
@@ -7876,7 +7869,7 @@
           <a:graphicData uri="http://schemas.openxmlformats.org/presentationml/2006/ole">
             <mc:AlternateContent xmlns:mc="http://schemas.openxmlformats.org/markup-compatibility/2006">
               <mc:Choice xmlns:v="urn:schemas-microsoft-com:vml" Requires="v">
-                <p:oleObj spid="_x0000_s17430" name="Packager Shell Object" showAsIcon="1" r:id="rId3" imgW="2354400" imgH="527400" progId="Package">
+                <p:oleObj spid="_x0000_s17432" name="Packager Shell Object" showAsIcon="1" r:id="rId3" imgW="2354400" imgH="527400" progId="Package">
                   <p:embed/>
                 </p:oleObj>
               </mc:Choice>
@@ -8250,7 +8243,7 @@
           <a:graphicData uri="http://schemas.openxmlformats.org/presentationml/2006/ole">
             <mc:AlternateContent xmlns:mc="http://schemas.openxmlformats.org/markup-compatibility/2006">
               <mc:Choice xmlns:v="urn:schemas-microsoft-com:vml" Requires="v">
-                <p:oleObj spid="_x0000_s18445" name="Packager Shell Object" showAsIcon="1" r:id="rId4" imgW="2735280" imgH="527400" progId="Package">
+                <p:oleObj spid="_x0000_s18447" name="Packager Shell Object" showAsIcon="1" r:id="rId4" imgW="2735280" imgH="527400" progId="Package">
                   <p:embed/>
                 </p:oleObj>
               </mc:Choice>
@@ -8386,7 +8379,7 @@
           <a:graphicData uri="http://schemas.openxmlformats.org/presentationml/2006/ole">
             <mc:AlternateContent xmlns:mc="http://schemas.openxmlformats.org/markup-compatibility/2006">
               <mc:Choice xmlns:v="urn:schemas-microsoft-com:vml" Requires="v">
-                <p:oleObj spid="_x0000_s19469" name="Packager Shell Object" showAsIcon="1" r:id="rId4" imgW="2735280" imgH="527400" progId="Package">
+                <p:oleObj spid="_x0000_s19471" name="Packager Shell Object" showAsIcon="1" r:id="rId4" imgW="2735280" imgH="527400" progId="Package">
                   <p:embed/>
                 </p:oleObj>
               </mc:Choice>
@@ -8938,94 +8931,6 @@
 </p:sld>
 </file>
 
-<file path=ppt/slides/slide44.xml><?xml version="1.0" encoding="utf-8"?>
-<p:sld xmlns:a="http://schemas.openxmlformats.org/drawingml/2006/main" xmlns:r="http://schemas.openxmlformats.org/officeDocument/2006/relationships" xmlns:p="http://schemas.openxmlformats.org/presentationml/2006/main">
-  <p:cSld>
-    <p:spTree>
-      <p:nvGrpSpPr>
-        <p:cNvPr id="1" name=""/>
-        <p:cNvGrpSpPr/>
-        <p:nvPr/>
-      </p:nvGrpSpPr>
-      <p:grpSpPr>
-        <a:xfrm>
-          <a:off x="0" y="0"/>
-          <a:ext cx="0" cy="0"/>
-          <a:chOff x="0" y="0"/>
-          <a:chExt cx="0" cy="0"/>
-        </a:xfrm>
-      </p:grpSpPr>
-      <p:sp>
-        <p:nvSpPr>
-          <p:cNvPr id="2" name="Title 1"/>
-          <p:cNvSpPr>
-            <a:spLocks noGrp="1"/>
-          </p:cNvSpPr>
-          <p:nvPr>
-            <p:ph type="title"/>
-          </p:nvPr>
-        </p:nvSpPr>
-        <p:spPr/>
-        <p:txBody>
-          <a:bodyPr/>
-          <a:lstStyle/>
-          <a:p>
-            <a:r>
-              <a:rPr lang="en-US" dirty="0" smtClean="0"/>
-              <a:t>AKS cluster </a:t>
-            </a:r>
-            <a:r>
-              <a:rPr lang="en-US" i="1" dirty="0" err="1" smtClean="0"/>
-              <a:t>netpol</a:t>
-            </a:r>
-            <a:r>
-              <a:rPr lang="en-US" i="1" dirty="0" smtClean="0"/>
-              <a:t>-working</a:t>
-            </a:r>
-            <a:r>
-              <a:rPr lang="en-US" dirty="0" smtClean="0"/>
-              <a:t> </a:t>
-            </a:r>
-            <a:r>
-              <a:rPr lang="en-US" dirty="0" err="1" smtClean="0"/>
-              <a:t>config</a:t>
-            </a:r>
-            <a:endParaRPr lang="en-US" dirty="0"/>
-          </a:p>
-        </p:txBody>
-      </p:sp>
-      <p:sp>
-        <p:nvSpPr>
-          <p:cNvPr id="3" name="Content Placeholder 2"/>
-          <p:cNvSpPr>
-            <a:spLocks noGrp="1"/>
-          </p:cNvSpPr>
-          <p:nvPr>
-            <p:ph idx="1"/>
-          </p:nvPr>
-        </p:nvSpPr>
-        <p:spPr/>
-        <p:txBody>
-          <a:bodyPr/>
-          <a:lstStyle/>
-          <a:p>
-            <a:endParaRPr lang="en-US"/>
-          </a:p>
-        </p:txBody>
-      </p:sp>
-    </p:spTree>
-    <p:extLst>
-      <p:ext uri="{BB962C8B-B14F-4D97-AF65-F5344CB8AC3E}">
-        <p14:creationId xmlns:p14="http://schemas.microsoft.com/office/powerpoint/2010/main" val="447112195"/>
-      </p:ext>
-    </p:extLst>
-  </p:cSld>
-  <p:clrMapOvr>
-    <a:masterClrMapping/>
-  </p:clrMapOvr>
-</p:sld>
-</file>
-
 <file path=ppt/slides/slide5.xml><?xml version="1.0" encoding="utf-8"?>
 <p:sld xmlns:a="http://schemas.openxmlformats.org/drawingml/2006/main" xmlns:r="http://schemas.openxmlformats.org/officeDocument/2006/relationships" xmlns:p="http://schemas.openxmlformats.org/presentationml/2006/main">
   <p:cSld>
@@ -9246,7 +9151,7 @@
           <a:graphicData uri="http://schemas.openxmlformats.org/presentationml/2006/ole">
             <mc:AlternateContent xmlns:mc="http://schemas.openxmlformats.org/markup-compatibility/2006">
               <mc:Choice xmlns:v="urn:schemas-microsoft-com:vml" Requires="v">
-                <p:oleObj spid="_x0000_s2246" name="Packager Shell Object" showAsIcon="1" r:id="rId3" imgW="1523880" imgH="527400" progId="Package">
+                <p:oleObj spid="_x0000_s2250" name="Packager Shell Object" showAsIcon="1" r:id="rId3" imgW="1523880" imgH="527400" progId="Package">
                   <p:embed/>
                 </p:oleObj>
               </mc:Choice>
@@ -9303,7 +9208,7 @@
           <a:graphicData uri="http://schemas.openxmlformats.org/presentationml/2006/ole">
             <mc:AlternateContent xmlns:mc="http://schemas.openxmlformats.org/markup-compatibility/2006">
               <mc:Choice xmlns:v="urn:schemas-microsoft-com:vml" Requires="v">
-                <p:oleObj spid="_x0000_s2247" name="Packager Shell Object" showAsIcon="1" r:id="rId5" imgW="1934280" imgH="527400" progId="Package">
+                <p:oleObj spid="_x0000_s2251" name="Packager Shell Object" showAsIcon="1" r:id="rId5" imgW="1934280" imgH="527400" progId="Package">
                   <p:embed/>
                 </p:oleObj>
               </mc:Choice>
@@ -9439,7 +9344,7 @@
           <a:graphicData uri="http://schemas.openxmlformats.org/presentationml/2006/ole">
             <mc:AlternateContent xmlns:mc="http://schemas.openxmlformats.org/markup-compatibility/2006">
               <mc:Choice xmlns:v="urn:schemas-microsoft-com:vml" Requires="v">
-                <p:oleObj spid="_x0000_s3168" name="Packager Shell Object" showAsIcon="1" r:id="rId4" imgW="1914840" imgH="527400" progId="Package">
+                <p:oleObj spid="_x0000_s3170" name="Packager Shell Object" showAsIcon="1" r:id="rId4" imgW="1914840" imgH="527400" progId="Package">
                   <p:embed/>
                 </p:oleObj>
               </mc:Choice>
@@ -9566,11 +9471,11 @@
   <p:tag name="ISFOXLABELINGONTITLEPAGESET" val="True"/>
   <p:tag name="ISFOXDOCUMENTCLASSIFICATIONVERSION" val="1"/>
   <p:tag name="ISFOXLABELUSERINTERACTION" val="True"/>
+  <p:tag name="ISFOXOLDCLASSIFICATIONID" val="00000000-0000-0000-0000-000000000000"/>
   <p:tag name="ISFOXCLASSIFICATIONID" val="7d788e96-5802-48f7-b87f-ef0226e41b7c"/>
   <p:tag name="ISFOXCLASSIFICATIONNAME" val="Public"/>
   <p:tag name="ISFOXPREFIX" val="HvS"/>
   <p:tag name="ISFOXSHOWCLASSIFICATIONREQUESTDIALOG" val="False"/>
-  <p:tag name="ISFOXOLDCLASSIFICATIONID" val="7d788e96-5802-48f7-b87f-ef0226e41b7c"/>
   <p:tag name="ISFOXCLASSIFICATIONINKEYWORDS" val="Public"/>
   <p:tag name="ISFOXDOVERSIONINGONSAVE" val="0"/>
 </p:tagLst>

</xml_diff>

<commit_message>
wrote out risk estimate approach
</commit_message>
<xml_diff>
--- a/Screenshots.pptx
+++ b/Screenshots.pptx
@@ -242,7 +242,7 @@
           <a:p>
             <a:fld id="{4B5D7A1E-C70D-470C-8980-F4393258158A}" type="datetimeFigureOut">
               <a:rPr lang="en-US" smtClean="0"/>
-              <a:t>7/16/2019</a:t>
+              <a:t>7/30/2019</a:t>
             </a:fld>
             <a:endParaRPr lang="en-US"/>
           </a:p>
@@ -1011,7 +1011,7 @@
           <a:p>
             <a:fld id="{011329FE-3067-425C-BB62-250DE2A431FA}" type="datetimeFigureOut">
               <a:rPr lang="en-US" smtClean="0"/>
-              <a:t>7/16/2019</a:t>
+              <a:t>7/30/2019</a:t>
             </a:fld>
             <a:endParaRPr lang="en-US"/>
           </a:p>
@@ -1181,7 +1181,7 @@
           <a:p>
             <a:fld id="{011329FE-3067-425C-BB62-250DE2A431FA}" type="datetimeFigureOut">
               <a:rPr lang="en-US" smtClean="0"/>
-              <a:t>7/16/2019</a:t>
+              <a:t>7/30/2019</a:t>
             </a:fld>
             <a:endParaRPr lang="en-US"/>
           </a:p>
@@ -1361,7 +1361,7 @@
           <a:p>
             <a:fld id="{011329FE-3067-425C-BB62-250DE2A431FA}" type="datetimeFigureOut">
               <a:rPr lang="en-US" smtClean="0"/>
-              <a:t>7/16/2019</a:t>
+              <a:t>7/30/2019</a:t>
             </a:fld>
             <a:endParaRPr lang="en-US"/>
           </a:p>
@@ -1531,7 +1531,7 @@
           <a:p>
             <a:fld id="{011329FE-3067-425C-BB62-250DE2A431FA}" type="datetimeFigureOut">
               <a:rPr lang="en-US" smtClean="0"/>
-              <a:t>7/16/2019</a:t>
+              <a:t>7/30/2019</a:t>
             </a:fld>
             <a:endParaRPr lang="en-US"/>
           </a:p>
@@ -1777,7 +1777,7 @@
           <a:p>
             <a:fld id="{011329FE-3067-425C-BB62-250DE2A431FA}" type="datetimeFigureOut">
               <a:rPr lang="en-US" smtClean="0"/>
-              <a:t>7/16/2019</a:t>
+              <a:t>7/30/2019</a:t>
             </a:fld>
             <a:endParaRPr lang="en-US"/>
           </a:p>
@@ -2009,7 +2009,7 @@
           <a:p>
             <a:fld id="{011329FE-3067-425C-BB62-250DE2A431FA}" type="datetimeFigureOut">
               <a:rPr lang="en-US" smtClean="0"/>
-              <a:t>7/16/2019</a:t>
+              <a:t>7/30/2019</a:t>
             </a:fld>
             <a:endParaRPr lang="en-US"/>
           </a:p>
@@ -2376,7 +2376,7 @@
           <a:p>
             <a:fld id="{011329FE-3067-425C-BB62-250DE2A431FA}" type="datetimeFigureOut">
               <a:rPr lang="en-US" smtClean="0"/>
-              <a:t>7/16/2019</a:t>
+              <a:t>7/30/2019</a:t>
             </a:fld>
             <a:endParaRPr lang="en-US"/>
           </a:p>
@@ -2494,7 +2494,7 @@
           <a:p>
             <a:fld id="{011329FE-3067-425C-BB62-250DE2A431FA}" type="datetimeFigureOut">
               <a:rPr lang="en-US" smtClean="0"/>
-              <a:t>7/16/2019</a:t>
+              <a:t>7/30/2019</a:t>
             </a:fld>
             <a:endParaRPr lang="en-US"/>
           </a:p>
@@ -2589,7 +2589,7 @@
           <a:p>
             <a:fld id="{011329FE-3067-425C-BB62-250DE2A431FA}" type="datetimeFigureOut">
               <a:rPr lang="en-US" smtClean="0"/>
-              <a:t>7/16/2019</a:t>
+              <a:t>7/30/2019</a:t>
             </a:fld>
             <a:endParaRPr lang="en-US"/>
           </a:p>
@@ -2866,7 +2866,7 @@
           <a:p>
             <a:fld id="{011329FE-3067-425C-BB62-250DE2A431FA}" type="datetimeFigureOut">
               <a:rPr lang="en-US" smtClean="0"/>
-              <a:t>7/16/2019</a:t>
+              <a:t>7/30/2019</a:t>
             </a:fld>
             <a:endParaRPr lang="en-US"/>
           </a:p>
@@ -3119,7 +3119,7 @@
           <a:p>
             <a:fld id="{011329FE-3067-425C-BB62-250DE2A431FA}" type="datetimeFigureOut">
               <a:rPr lang="en-US" smtClean="0"/>
-              <a:t>7/16/2019</a:t>
+              <a:t>7/30/2019</a:t>
             </a:fld>
             <a:endParaRPr lang="en-US"/>
           </a:p>
@@ -3332,7 +3332,7 @@
           <a:p>
             <a:fld id="{011329FE-3067-425C-BB62-250DE2A431FA}" type="datetimeFigureOut">
               <a:rPr lang="en-US" smtClean="0"/>
-              <a:t>7/16/2019</a:t>
+              <a:t>7/30/2019</a:t>
             </a:fld>
             <a:endParaRPr lang="en-US"/>
           </a:p>
@@ -4148,7 +4148,7 @@
           <a:graphicData uri="http://schemas.openxmlformats.org/presentationml/2006/ole">
             <mc:AlternateContent xmlns:mc="http://schemas.openxmlformats.org/markup-compatibility/2006">
               <mc:Choice xmlns:v="urn:schemas-microsoft-com:vml" Requires="v">
-                <p:oleObj spid="_x0000_s5205" name="Packager Shell Object" showAsIcon="1" r:id="rId4" imgW="788040" imgH="311400" progId="Package">
+                <p:oleObj spid="_x0000_s5207" name="Packager Shell Object" showAsIcon="1" r:id="rId4" imgW="788040" imgH="311400" progId="Package">
                   <p:embed/>
                 </p:oleObj>
               </mc:Choice>
@@ -4708,7 +4708,7 @@
           <a:graphicData uri="http://schemas.openxmlformats.org/presentationml/2006/ole">
             <mc:AlternateContent xmlns:mc="http://schemas.openxmlformats.org/markup-compatibility/2006">
               <mc:Choice xmlns:v="urn:schemas-microsoft-com:vml" Requires="v">
-                <p:oleObj spid="_x0000_s4183" name="Packager Shell Object" showAsIcon="1" r:id="rId3" imgW="1396800" imgH="527400" progId="Package">
+                <p:oleObj spid="_x0000_s4185" name="Packager Shell Object" showAsIcon="1" r:id="rId3" imgW="1396800" imgH="527400" progId="Package">
                   <p:embed/>
                 </p:oleObj>
               </mc:Choice>
@@ -4844,7 +4844,7 @@
           <a:graphicData uri="http://schemas.openxmlformats.org/presentationml/2006/ole">
             <mc:AlternateContent xmlns:mc="http://schemas.openxmlformats.org/markup-compatibility/2006">
               <mc:Choice xmlns:v="urn:schemas-microsoft-com:vml" Requires="v">
-                <p:oleObj spid="_x0000_s6224" name="Packager Shell Object" showAsIcon="1" r:id="rId4" imgW="1768320" imgH="527400" progId="Package">
+                <p:oleObj spid="_x0000_s6226" name="Packager Shell Object" showAsIcon="1" r:id="rId4" imgW="1768320" imgH="527400" progId="Package">
                   <p:embed/>
                 </p:oleObj>
               </mc:Choice>
@@ -6190,7 +6190,7 @@
           <a:graphicData uri="http://schemas.openxmlformats.org/presentationml/2006/ole">
             <mc:AlternateContent xmlns:mc="http://schemas.openxmlformats.org/markup-compatibility/2006">
               <mc:Choice xmlns:v="urn:schemas-microsoft-com:vml" Requires="v">
-                <p:oleObj spid="_x0000_s8324" name="Packager Shell Object" showAsIcon="1" r:id="rId3" imgW="1543320" imgH="527400" progId="Package">
+                <p:oleObj spid="_x0000_s8328" name="Packager Shell Object" showAsIcon="1" r:id="rId3" imgW="1543320" imgH="527400" progId="Package">
                   <p:embed/>
                 </p:oleObj>
               </mc:Choice>
@@ -6247,7 +6247,7 @@
           <a:graphicData uri="http://schemas.openxmlformats.org/presentationml/2006/ole">
             <mc:AlternateContent xmlns:mc="http://schemas.openxmlformats.org/markup-compatibility/2006">
               <mc:Choice xmlns:v="urn:schemas-microsoft-com:vml" Requires="v">
-                <p:oleObj spid="_x0000_s8325" name="Packager Shell Object" showAsIcon="1" r:id="rId5" imgW="1963440" imgH="527400" progId="Package">
+                <p:oleObj spid="_x0000_s8329" name="Packager Shell Object" showAsIcon="1" r:id="rId5" imgW="1963440" imgH="527400" progId="Package">
                   <p:embed/>
                 </p:oleObj>
               </mc:Choice>
@@ -6698,7 +6698,7 @@
           <a:graphicData uri="http://schemas.openxmlformats.org/presentationml/2006/ole">
             <mc:AlternateContent xmlns:mc="http://schemas.openxmlformats.org/markup-compatibility/2006">
               <mc:Choice xmlns:v="urn:schemas-microsoft-com:vml" Requires="v">
-                <p:oleObj spid="_x0000_s14376" name="Packager Shell Object" showAsIcon="1" r:id="rId5" imgW="2569320" imgH="527400" progId="Package">
+                <p:oleObj spid="_x0000_s14378" name="Packager Shell Object" showAsIcon="1" r:id="rId5" imgW="2569320" imgH="527400" progId="Package">
                   <p:embed/>
                 </p:oleObj>
               </mc:Choice>
@@ -6802,7 +6802,7 @@
           <a:graphicData uri="http://schemas.openxmlformats.org/presentationml/2006/ole">
             <mc:AlternateContent xmlns:mc="http://schemas.openxmlformats.org/markup-compatibility/2006">
               <mc:Choice xmlns:v="urn:schemas-microsoft-com:vml" Requires="v">
-                <p:oleObj spid="_x0000_s15400" name="Packager Shell Object" showAsIcon="1" r:id="rId4" imgW="2569320" imgH="527400" progId="Package">
+                <p:oleObj spid="_x0000_s15402" name="Packager Shell Object" showAsIcon="1" r:id="rId4" imgW="2569320" imgH="527400" progId="Package">
                   <p:embed/>
                 </p:oleObj>
               </mc:Choice>
@@ -7327,7 +7327,7 @@
           <a:graphicData uri="http://schemas.openxmlformats.org/presentationml/2006/ole">
             <mc:AlternateContent xmlns:mc="http://schemas.openxmlformats.org/markup-compatibility/2006">
               <mc:Choice xmlns:v="urn:schemas-microsoft-com:vml" Requires="v">
-                <p:oleObj spid="_x0000_s16411" name="Packager Shell Object" showAsIcon="1" r:id="rId4" imgW="2510640" imgH="527400" progId="Package">
+                <p:oleObj spid="_x0000_s16413" name="Packager Shell Object" showAsIcon="1" r:id="rId4" imgW="2510640" imgH="527400" progId="Package">
                   <p:embed/>
                 </p:oleObj>
               </mc:Choice>
@@ -7869,7 +7869,7 @@
           <a:graphicData uri="http://schemas.openxmlformats.org/presentationml/2006/ole">
             <mc:AlternateContent xmlns:mc="http://schemas.openxmlformats.org/markup-compatibility/2006">
               <mc:Choice xmlns:v="urn:schemas-microsoft-com:vml" Requires="v">
-                <p:oleObj spid="_x0000_s17432" name="Packager Shell Object" showAsIcon="1" r:id="rId3" imgW="2354400" imgH="527400" progId="Package">
+                <p:oleObj spid="_x0000_s17434" name="Packager Shell Object" showAsIcon="1" r:id="rId3" imgW="2354400" imgH="527400" progId="Package">
                   <p:embed/>
                 </p:oleObj>
               </mc:Choice>
@@ -8243,7 +8243,7 @@
           <a:graphicData uri="http://schemas.openxmlformats.org/presentationml/2006/ole">
             <mc:AlternateContent xmlns:mc="http://schemas.openxmlformats.org/markup-compatibility/2006">
               <mc:Choice xmlns:v="urn:schemas-microsoft-com:vml" Requires="v">
-                <p:oleObj spid="_x0000_s18447" name="Packager Shell Object" showAsIcon="1" r:id="rId4" imgW="2735280" imgH="527400" progId="Package">
+                <p:oleObj spid="_x0000_s18449" name="Packager Shell Object" showAsIcon="1" r:id="rId4" imgW="2735280" imgH="527400" progId="Package">
                   <p:embed/>
                 </p:oleObj>
               </mc:Choice>
@@ -8379,7 +8379,7 @@
           <a:graphicData uri="http://schemas.openxmlformats.org/presentationml/2006/ole">
             <mc:AlternateContent xmlns:mc="http://schemas.openxmlformats.org/markup-compatibility/2006">
               <mc:Choice xmlns:v="urn:schemas-microsoft-com:vml" Requires="v">
-                <p:oleObj spid="_x0000_s19471" name="Packager Shell Object" showAsIcon="1" r:id="rId4" imgW="2735280" imgH="527400" progId="Package">
+                <p:oleObj spid="_x0000_s19473" name="Packager Shell Object" showAsIcon="1" r:id="rId4" imgW="2735280" imgH="527400" progId="Package">
                   <p:embed/>
                 </p:oleObj>
               </mc:Choice>
@@ -9151,7 +9151,7 @@
           <a:graphicData uri="http://schemas.openxmlformats.org/presentationml/2006/ole">
             <mc:AlternateContent xmlns:mc="http://schemas.openxmlformats.org/markup-compatibility/2006">
               <mc:Choice xmlns:v="urn:schemas-microsoft-com:vml" Requires="v">
-                <p:oleObj spid="_x0000_s2250" name="Packager Shell Object" showAsIcon="1" r:id="rId3" imgW="1523880" imgH="527400" progId="Package">
+                <p:oleObj spid="_x0000_s2254" name="Packager Shell Object" showAsIcon="1" r:id="rId3" imgW="1523880" imgH="527400" progId="Package">
                   <p:embed/>
                 </p:oleObj>
               </mc:Choice>
@@ -9208,7 +9208,7 @@
           <a:graphicData uri="http://schemas.openxmlformats.org/presentationml/2006/ole">
             <mc:AlternateContent xmlns:mc="http://schemas.openxmlformats.org/markup-compatibility/2006">
               <mc:Choice xmlns:v="urn:schemas-microsoft-com:vml" Requires="v">
-                <p:oleObj spid="_x0000_s2251" name="Packager Shell Object" showAsIcon="1" r:id="rId5" imgW="1934280" imgH="527400" progId="Package">
+                <p:oleObj spid="_x0000_s2255" name="Packager Shell Object" showAsIcon="1" r:id="rId5" imgW="1934280" imgH="527400" progId="Package">
                   <p:embed/>
                 </p:oleObj>
               </mc:Choice>
@@ -9344,7 +9344,7 @@
           <a:graphicData uri="http://schemas.openxmlformats.org/presentationml/2006/ole">
             <mc:AlternateContent xmlns:mc="http://schemas.openxmlformats.org/markup-compatibility/2006">
               <mc:Choice xmlns:v="urn:schemas-microsoft-com:vml" Requires="v">
-                <p:oleObj spid="_x0000_s3170" name="Packager Shell Object" showAsIcon="1" r:id="rId4" imgW="1914840" imgH="527400" progId="Package">
+                <p:oleObj spid="_x0000_s3172" name="Packager Shell Object" showAsIcon="1" r:id="rId4" imgW="1914840" imgH="527400" progId="Package">
                   <p:embed/>
                 </p:oleObj>
               </mc:Choice>

</xml_diff>